<commit_message>
Adding support for adding thought for the day
</commit_message>
<xml_diff>
--- a/WebContent/WEB-INF/suffix.pptx
+++ b/WebContent/WEB-INF/suffix.pptx
@@ -5,7 +5,7 @@
     <p:sldMasterId id="2147483648" r:id="rId1"/>
   </p:sldMasterIdLst>
   <p:notesMasterIdLst>
-    <p:notesMasterId r:id="rId20"/>
+    <p:notesMasterId r:id="rId14"/>
   </p:notesMasterIdLst>
   <p:sldIdLst>
     <p:sldId id="256" r:id="rId2"/>
@@ -20,12 +20,6 @@
     <p:sldId id="265" r:id="rId11"/>
     <p:sldId id="266" r:id="rId12"/>
     <p:sldId id="267" r:id="rId13"/>
-    <p:sldId id="268" r:id="rId14"/>
-    <p:sldId id="269" r:id="rId15"/>
-    <p:sldId id="270" r:id="rId16"/>
-    <p:sldId id="271" r:id="rId17"/>
-    <p:sldId id="272" r:id="rId18"/>
-    <p:sldId id="273" r:id="rId19"/>
   </p:sldIdLst>
   <p:sldSz cx="9144000" cy="6858000" type="screen4x3"/>
   <p:notesSz cx="6858000" cy="9144000"/>
@@ -209,7 +203,7 @@
           <a:p>
             <a:fld id="{5B29A9C2-7D74-B54D-8DD6-D6378F394E63}" type="datetimeFigureOut">
               <a:rPr lang="en-US" smtClean="0"/>
-              <a:t>4/27/15</a:t>
+              <a:t>4/30/15</a:t>
             </a:fld>
             <a:endParaRPr lang="en-US"/>
           </a:p>
@@ -1195,678 +1189,6 @@
 </p:notes>
 </file>
 
-<file path=ppt/notesSlides/notesSlide13.xml><?xml version="1.0" encoding="utf-8"?>
-<p:notes xmlns:a="http://schemas.openxmlformats.org/drawingml/2006/main" xmlns:r="http://schemas.openxmlformats.org/officeDocument/2006/relationships" xmlns:p="http://schemas.openxmlformats.org/presentationml/2006/main">
-  <p:cSld>
-    <p:spTree>
-      <p:nvGrpSpPr>
-        <p:cNvPr id="1" name=""/>
-        <p:cNvGrpSpPr/>
-        <p:nvPr/>
-      </p:nvGrpSpPr>
-      <p:grpSpPr>
-        <a:xfrm>
-          <a:off x="0" y="0"/>
-          <a:ext cx="0" cy="0"/>
-          <a:chOff x="0" y="0"/>
-          <a:chExt cx="0" cy="0"/>
-        </a:xfrm>
-      </p:grpSpPr>
-      <p:sp>
-        <p:nvSpPr>
-          <p:cNvPr id="27650" name="Slide Image Placeholder 1"/>
-          <p:cNvSpPr>
-            <a:spLocks noGrp="1" noRot="1" noChangeAspect="1" noTextEdit="1"/>
-          </p:cNvSpPr>
-          <p:nvPr>
-            <p:ph type="sldImg"/>
-          </p:nvPr>
-        </p:nvSpPr>
-        <p:spPr bwMode="auto">
-          <a:noFill/>
-          <a:ln>
-            <a:solidFill>
-              <a:srgbClr val="000000"/>
-            </a:solidFill>
-            <a:miter lim="800000"/>
-            <a:headEnd/>
-            <a:tailEnd/>
-          </a:ln>
-        </p:spPr>
-      </p:sp>
-      <p:sp>
-        <p:nvSpPr>
-          <p:cNvPr id="27651" name="Notes Placeholder 2"/>
-          <p:cNvSpPr>
-            <a:spLocks noGrp="1"/>
-          </p:cNvSpPr>
-          <p:nvPr>
-            <p:ph type="body" idx="1"/>
-          </p:nvPr>
-        </p:nvSpPr>
-        <p:spPr bwMode="auto">
-          <a:noFill/>
-        </p:spPr>
-        <p:txBody>
-          <a:bodyPr wrap="square" numCol="1" anchor="t" anchorCtr="0" compatLnSpc="1">
-            <a:prstTxWarp prst="textNoShape">
-              <a:avLst/>
-            </a:prstTxWarp>
-          </a:bodyPr>
-          <a:lstStyle/>
-          <a:p>
-            <a:endParaRPr lang="en-US" smtClean="0"/>
-          </a:p>
-        </p:txBody>
-      </p:sp>
-      <p:sp>
-        <p:nvSpPr>
-          <p:cNvPr id="27652" name="Slide Number Placeholder 3"/>
-          <p:cNvSpPr>
-            <a:spLocks noGrp="1"/>
-          </p:cNvSpPr>
-          <p:nvPr>
-            <p:ph type="sldNum" sz="quarter" idx="5"/>
-          </p:nvPr>
-        </p:nvSpPr>
-        <p:spPr bwMode="auto">
-          <a:noFill/>
-          <a:ln>
-            <a:miter lim="800000"/>
-            <a:headEnd/>
-            <a:tailEnd/>
-          </a:ln>
-        </p:spPr>
-        <p:txBody>
-          <a:bodyPr/>
-          <a:lstStyle/>
-          <a:p>
-            <a:fld id="{2795BDC4-A519-4C0A-BD8C-93DEA6B4F30F}" type="slidenum">
-              <a:rPr lang="en-US" smtClean="0">
-                <a:cs typeface="Arial" charset="0"/>
-              </a:rPr>
-              <a:pPr/>
-              <a:t>13</a:t>
-            </a:fld>
-            <a:endParaRPr lang="en-US" smtClean="0">
-              <a:cs typeface="Arial" charset="0"/>
-            </a:endParaRPr>
-          </a:p>
-        </p:txBody>
-      </p:sp>
-    </p:spTree>
-  </p:cSld>
-  <p:clrMapOvr>
-    <a:masterClrMapping/>
-  </p:clrMapOvr>
-</p:notes>
-</file>
-
-<file path=ppt/notesSlides/notesSlide14.xml><?xml version="1.0" encoding="utf-8"?>
-<p:notes xmlns:a="http://schemas.openxmlformats.org/drawingml/2006/main" xmlns:r="http://schemas.openxmlformats.org/officeDocument/2006/relationships" xmlns:p="http://schemas.openxmlformats.org/presentationml/2006/main">
-  <p:cSld>
-    <p:spTree>
-      <p:nvGrpSpPr>
-        <p:cNvPr id="1" name=""/>
-        <p:cNvGrpSpPr/>
-        <p:nvPr/>
-      </p:nvGrpSpPr>
-      <p:grpSpPr>
-        <a:xfrm>
-          <a:off x="0" y="0"/>
-          <a:ext cx="0" cy="0"/>
-          <a:chOff x="0" y="0"/>
-          <a:chExt cx="0" cy="0"/>
-        </a:xfrm>
-      </p:grpSpPr>
-      <p:sp>
-        <p:nvSpPr>
-          <p:cNvPr id="87042" name="Slide Image Placeholder 1"/>
-          <p:cNvSpPr>
-            <a:spLocks noGrp="1" noRot="1" noChangeAspect="1" noTextEdit="1"/>
-          </p:cNvSpPr>
-          <p:nvPr>
-            <p:ph type="sldImg"/>
-          </p:nvPr>
-        </p:nvSpPr>
-        <p:spPr bwMode="auto">
-          <a:noFill/>
-          <a:ln>
-            <a:solidFill>
-              <a:srgbClr val="000000"/>
-            </a:solidFill>
-            <a:miter lim="800000"/>
-            <a:headEnd/>
-            <a:tailEnd/>
-          </a:ln>
-        </p:spPr>
-      </p:sp>
-      <p:sp>
-        <p:nvSpPr>
-          <p:cNvPr id="87043" name="Notes Placeholder 2"/>
-          <p:cNvSpPr>
-            <a:spLocks noGrp="1"/>
-          </p:cNvSpPr>
-          <p:nvPr>
-            <p:ph type="body" idx="1"/>
-          </p:nvPr>
-        </p:nvSpPr>
-        <p:spPr bwMode="auto">
-          <a:noFill/>
-        </p:spPr>
-        <p:txBody>
-          <a:bodyPr wrap="square" numCol="1" anchor="t" anchorCtr="0" compatLnSpc="1">
-            <a:prstTxWarp prst="textNoShape">
-              <a:avLst/>
-            </a:prstTxWarp>
-          </a:bodyPr>
-          <a:lstStyle/>
-          <a:p>
-            <a:endParaRPr lang="en-US" altLang="en-US" smtClean="0"/>
-          </a:p>
-        </p:txBody>
-      </p:sp>
-      <p:sp>
-        <p:nvSpPr>
-          <p:cNvPr id="87044" name="Slide Number Placeholder 3"/>
-          <p:cNvSpPr>
-            <a:spLocks noGrp="1"/>
-          </p:cNvSpPr>
-          <p:nvPr>
-            <p:ph type="sldNum" sz="quarter" idx="5"/>
-          </p:nvPr>
-        </p:nvSpPr>
-        <p:spPr bwMode="auto">
-          <a:noFill/>
-          <a:ln>
-            <a:miter lim="800000"/>
-            <a:headEnd/>
-            <a:tailEnd/>
-          </a:ln>
-        </p:spPr>
-        <p:txBody>
-          <a:bodyPr/>
-          <a:lstStyle/>
-          <a:p>
-            <a:fld id="{E6B0FB1B-1821-426C-A041-C8E437BDD09B}" type="slidenum">
-              <a:rPr lang="en-US" altLang="en-US" smtClean="0"/>
-              <a:pPr/>
-              <a:t>14</a:t>
-            </a:fld>
-            <a:endParaRPr lang="en-US" altLang="en-US" smtClean="0"/>
-          </a:p>
-        </p:txBody>
-      </p:sp>
-    </p:spTree>
-  </p:cSld>
-  <p:clrMapOvr>
-    <a:masterClrMapping/>
-  </p:clrMapOvr>
-</p:notes>
-</file>
-
-<file path=ppt/notesSlides/notesSlide15.xml><?xml version="1.0" encoding="utf-8"?>
-<p:notes xmlns:a="http://schemas.openxmlformats.org/drawingml/2006/main" xmlns:r="http://schemas.openxmlformats.org/officeDocument/2006/relationships" xmlns:p="http://schemas.openxmlformats.org/presentationml/2006/main">
-  <p:cSld>
-    <p:spTree>
-      <p:nvGrpSpPr>
-        <p:cNvPr id="1" name=""/>
-        <p:cNvGrpSpPr/>
-        <p:nvPr/>
-      </p:nvGrpSpPr>
-      <p:grpSpPr>
-        <a:xfrm>
-          <a:off x="0" y="0"/>
-          <a:ext cx="0" cy="0"/>
-          <a:chOff x="0" y="0"/>
-          <a:chExt cx="0" cy="0"/>
-        </a:xfrm>
-      </p:grpSpPr>
-      <p:sp>
-        <p:nvSpPr>
-          <p:cNvPr id="89090" name="Slide Image Placeholder 1"/>
-          <p:cNvSpPr>
-            <a:spLocks noGrp="1" noRot="1" noChangeAspect="1" noTextEdit="1"/>
-          </p:cNvSpPr>
-          <p:nvPr>
-            <p:ph type="sldImg"/>
-          </p:nvPr>
-        </p:nvSpPr>
-        <p:spPr bwMode="auto">
-          <a:noFill/>
-          <a:ln>
-            <a:solidFill>
-              <a:srgbClr val="000000"/>
-            </a:solidFill>
-            <a:miter lim="800000"/>
-            <a:headEnd/>
-            <a:tailEnd/>
-          </a:ln>
-        </p:spPr>
-      </p:sp>
-      <p:sp>
-        <p:nvSpPr>
-          <p:cNvPr id="89091" name="Notes Placeholder 2"/>
-          <p:cNvSpPr>
-            <a:spLocks noGrp="1"/>
-          </p:cNvSpPr>
-          <p:nvPr>
-            <p:ph type="body" idx="1"/>
-          </p:nvPr>
-        </p:nvSpPr>
-        <p:spPr bwMode="auto">
-          <a:noFill/>
-        </p:spPr>
-        <p:txBody>
-          <a:bodyPr wrap="square" numCol="1" anchor="t" anchorCtr="0" compatLnSpc="1">
-            <a:prstTxWarp prst="textNoShape">
-              <a:avLst/>
-            </a:prstTxWarp>
-          </a:bodyPr>
-          <a:lstStyle/>
-          <a:p>
-            <a:endParaRPr lang="en-US" smtClean="0"/>
-          </a:p>
-        </p:txBody>
-      </p:sp>
-      <p:sp>
-        <p:nvSpPr>
-          <p:cNvPr id="89092" name="Slide Number Placeholder 3"/>
-          <p:cNvSpPr>
-            <a:spLocks noGrp="1"/>
-          </p:cNvSpPr>
-          <p:nvPr>
-            <p:ph type="sldNum" sz="quarter" idx="5"/>
-          </p:nvPr>
-        </p:nvSpPr>
-        <p:spPr bwMode="auto">
-          <a:noFill/>
-          <a:ln>
-            <a:miter lim="800000"/>
-            <a:headEnd/>
-            <a:tailEnd/>
-          </a:ln>
-        </p:spPr>
-        <p:txBody>
-          <a:bodyPr/>
-          <a:lstStyle/>
-          <a:p>
-            <a:fld id="{4C12EAE7-4712-4416-A618-DDB2C9592AD1}" type="slidenum">
-              <a:rPr lang="en-US" smtClean="0"/>
-              <a:pPr/>
-              <a:t>15</a:t>
-            </a:fld>
-            <a:endParaRPr lang="en-US" smtClean="0"/>
-          </a:p>
-        </p:txBody>
-      </p:sp>
-    </p:spTree>
-  </p:cSld>
-  <p:clrMapOvr>
-    <a:masterClrMapping/>
-  </p:clrMapOvr>
-</p:notes>
-</file>
-
-<file path=ppt/notesSlides/notesSlide16.xml><?xml version="1.0" encoding="utf-8"?>
-<p:notes xmlns:a="http://schemas.openxmlformats.org/drawingml/2006/main" xmlns:r="http://schemas.openxmlformats.org/officeDocument/2006/relationships" xmlns:p="http://schemas.openxmlformats.org/presentationml/2006/main">
-  <p:cSld>
-    <p:spTree>
-      <p:nvGrpSpPr>
-        <p:cNvPr id="1" name=""/>
-        <p:cNvGrpSpPr/>
-        <p:nvPr/>
-      </p:nvGrpSpPr>
-      <p:grpSpPr>
-        <a:xfrm>
-          <a:off x="0" y="0"/>
-          <a:ext cx="0" cy="0"/>
-          <a:chOff x="0" y="0"/>
-          <a:chExt cx="0" cy="0"/>
-        </a:xfrm>
-      </p:grpSpPr>
-      <p:sp>
-        <p:nvSpPr>
-          <p:cNvPr id="90114" name="Slide Image Placeholder 1"/>
-          <p:cNvSpPr>
-            <a:spLocks noGrp="1" noRot="1" noChangeAspect="1" noTextEdit="1"/>
-          </p:cNvSpPr>
-          <p:nvPr>
-            <p:ph type="sldImg"/>
-          </p:nvPr>
-        </p:nvSpPr>
-        <p:spPr bwMode="auto">
-          <a:noFill/>
-          <a:ln>
-            <a:solidFill>
-              <a:srgbClr val="000000"/>
-            </a:solidFill>
-            <a:miter lim="800000"/>
-            <a:headEnd/>
-            <a:tailEnd/>
-          </a:ln>
-        </p:spPr>
-      </p:sp>
-      <p:sp>
-        <p:nvSpPr>
-          <p:cNvPr id="90115" name="Notes Placeholder 2"/>
-          <p:cNvSpPr>
-            <a:spLocks noGrp="1"/>
-          </p:cNvSpPr>
-          <p:nvPr>
-            <p:ph type="body" idx="1"/>
-          </p:nvPr>
-        </p:nvSpPr>
-        <p:spPr bwMode="auto">
-          <a:noFill/>
-        </p:spPr>
-        <p:txBody>
-          <a:bodyPr wrap="square" numCol="1" anchor="t" anchorCtr="0" compatLnSpc="1">
-            <a:prstTxWarp prst="textNoShape">
-              <a:avLst/>
-            </a:prstTxWarp>
-          </a:bodyPr>
-          <a:lstStyle/>
-          <a:p>
-            <a:endParaRPr lang="en-US" smtClean="0"/>
-          </a:p>
-        </p:txBody>
-      </p:sp>
-      <p:sp>
-        <p:nvSpPr>
-          <p:cNvPr id="90116" name="Slide Number Placeholder 3"/>
-          <p:cNvSpPr>
-            <a:spLocks noGrp="1"/>
-          </p:cNvSpPr>
-          <p:nvPr>
-            <p:ph type="sldNum" sz="quarter" idx="5"/>
-          </p:nvPr>
-        </p:nvSpPr>
-        <p:spPr bwMode="auto">
-          <a:noFill/>
-          <a:ln>
-            <a:miter lim="800000"/>
-            <a:headEnd/>
-            <a:tailEnd/>
-          </a:ln>
-        </p:spPr>
-        <p:txBody>
-          <a:bodyPr/>
-          <a:lstStyle/>
-          <a:p>
-            <a:fld id="{02CDA5A4-BEFA-40C4-81EA-7F951776289F}" type="slidenum">
-              <a:rPr lang="en-US" smtClean="0"/>
-              <a:pPr/>
-              <a:t>16</a:t>
-            </a:fld>
-            <a:endParaRPr lang="en-US" smtClean="0"/>
-          </a:p>
-        </p:txBody>
-      </p:sp>
-    </p:spTree>
-  </p:cSld>
-  <p:clrMapOvr>
-    <a:masterClrMapping/>
-  </p:clrMapOvr>
-</p:notes>
-</file>
-
-<file path=ppt/notesSlides/notesSlide17.xml><?xml version="1.0" encoding="utf-8"?>
-<p:notes xmlns:a="http://schemas.openxmlformats.org/drawingml/2006/main" xmlns:r="http://schemas.openxmlformats.org/officeDocument/2006/relationships" xmlns:p="http://schemas.openxmlformats.org/presentationml/2006/main">
-  <p:cSld>
-    <p:spTree>
-      <p:nvGrpSpPr>
-        <p:cNvPr id="1" name=""/>
-        <p:cNvGrpSpPr/>
-        <p:nvPr/>
-      </p:nvGrpSpPr>
-      <p:grpSpPr>
-        <a:xfrm>
-          <a:off x="0" y="0"/>
-          <a:ext cx="0" cy="0"/>
-          <a:chOff x="0" y="0"/>
-          <a:chExt cx="0" cy="0"/>
-        </a:xfrm>
-      </p:grpSpPr>
-      <p:sp>
-        <p:nvSpPr>
-          <p:cNvPr id="66562" name="Slide Image Placeholder 1"/>
-          <p:cNvSpPr>
-            <a:spLocks noGrp="1" noRot="1" noChangeAspect="1" noTextEdit="1"/>
-          </p:cNvSpPr>
-          <p:nvPr>
-            <p:ph type="sldImg"/>
-          </p:nvPr>
-        </p:nvSpPr>
-        <p:spPr bwMode="auto">
-          <a:noFill/>
-          <a:ln>
-            <a:solidFill>
-              <a:srgbClr val="000000"/>
-            </a:solidFill>
-            <a:miter lim="800000"/>
-            <a:headEnd/>
-            <a:tailEnd/>
-          </a:ln>
-          <a:extLst>
-            <a:ext uri="{909E8E84-426E-40dd-AFC4-6F175D3DCCD1}">
-              <a14:hiddenFill xmlns:a14="http://schemas.microsoft.com/office/drawing/2010/main">
-                <a:solidFill>
-                  <a:srgbClr val="FFFFFF"/>
-                </a:solidFill>
-              </a14:hiddenFill>
-            </a:ext>
-          </a:extLst>
-        </p:spPr>
-      </p:sp>
-      <p:sp>
-        <p:nvSpPr>
-          <p:cNvPr id="66563" name="Notes Placeholder 2"/>
-          <p:cNvSpPr>
-            <a:spLocks noGrp="1"/>
-          </p:cNvSpPr>
-          <p:nvPr>
-            <p:ph type="body" idx="1"/>
-          </p:nvPr>
-        </p:nvSpPr>
-        <p:spPr bwMode="auto">
-          <a:noFill/>
-          <a:extLst>
-            <a:ext uri="{909E8E84-426E-40dd-AFC4-6F175D3DCCD1}">
-              <a14:hiddenFill xmlns:a14="http://schemas.microsoft.com/office/drawing/2010/main">
-                <a:solidFill>
-                  <a:srgbClr val="FFFFFF"/>
-                </a:solidFill>
-              </a14:hiddenFill>
-            </a:ext>
-            <a:ext uri="{91240B29-F687-4f45-9708-019B960494DF}">
-              <a14:hiddenLine xmlns:a14="http://schemas.microsoft.com/office/drawing/2010/main" w="9525">
-                <a:solidFill>
-                  <a:srgbClr val="000000"/>
-                </a:solidFill>
-                <a:miter lim="800000"/>
-                <a:headEnd/>
-                <a:tailEnd/>
-              </a14:hiddenLine>
-            </a:ext>
-          </a:extLst>
-        </p:spPr>
-        <p:txBody>
-          <a:bodyPr wrap="square" numCol="1" anchor="t" anchorCtr="0" compatLnSpc="1">
-            <a:prstTxWarp prst="textNoShape">
-              <a:avLst/>
-            </a:prstTxWarp>
-          </a:bodyPr>
-          <a:lstStyle/>
-          <a:p>
-            <a:endParaRPr lang="en-US" dirty="0" smtClean="0"/>
-          </a:p>
-        </p:txBody>
-      </p:sp>
-      <p:sp>
-        <p:nvSpPr>
-          <p:cNvPr id="66564" name="Slide Number Placeholder 3"/>
-          <p:cNvSpPr>
-            <a:spLocks noGrp="1"/>
-          </p:cNvSpPr>
-          <p:nvPr>
-            <p:ph type="sldNum" sz="quarter" idx="5"/>
-          </p:nvPr>
-        </p:nvSpPr>
-        <p:spPr bwMode="auto">
-          <a:noFill/>
-          <a:extLst>
-            <a:ext uri="{909E8E84-426E-40dd-AFC4-6F175D3DCCD1}">
-              <a14:hiddenFill xmlns:a14="http://schemas.microsoft.com/office/drawing/2010/main">
-                <a:solidFill>
-                  <a:srgbClr val="FFFFFF"/>
-                </a:solidFill>
-              </a14:hiddenFill>
-            </a:ext>
-            <a:ext uri="{91240B29-F687-4f45-9708-019B960494DF}">
-              <a14:hiddenLine xmlns:a14="http://schemas.microsoft.com/office/drawing/2010/main" w="9525">
-                <a:solidFill>
-                  <a:srgbClr val="000000"/>
-                </a:solidFill>
-                <a:miter lim="800000"/>
-                <a:headEnd/>
-                <a:tailEnd/>
-              </a14:hiddenLine>
-            </a:ext>
-          </a:extLst>
-        </p:spPr>
-        <p:txBody>
-          <a:bodyPr/>
-          <a:lstStyle>
-            <a:lvl1pPr>
-              <a:defRPr sz="1200">
-                <a:solidFill>
-                  <a:schemeClr val="tx1"/>
-                </a:solidFill>
-                <a:latin typeface="Calibri" pitchFamily="34" charset="0"/>
-                <a:ea typeface="MS PGothic" pitchFamily="34" charset="-128"/>
-              </a:defRPr>
-            </a:lvl1pPr>
-            <a:lvl2pPr marL="742950" indent="-285750">
-              <a:defRPr sz="1200">
-                <a:solidFill>
-                  <a:schemeClr val="tx1"/>
-                </a:solidFill>
-                <a:latin typeface="Calibri" pitchFamily="34" charset="0"/>
-                <a:ea typeface="MS PGothic" pitchFamily="34" charset="-128"/>
-              </a:defRPr>
-            </a:lvl2pPr>
-            <a:lvl3pPr marL="1143000" indent="-228600">
-              <a:defRPr sz="1200">
-                <a:solidFill>
-                  <a:schemeClr val="tx1"/>
-                </a:solidFill>
-                <a:latin typeface="Calibri" pitchFamily="34" charset="0"/>
-                <a:ea typeface="MS PGothic" pitchFamily="34" charset="-128"/>
-              </a:defRPr>
-            </a:lvl3pPr>
-            <a:lvl4pPr marL="1600200" indent="-228600">
-              <a:defRPr sz="1200">
-                <a:solidFill>
-                  <a:schemeClr val="tx1"/>
-                </a:solidFill>
-                <a:latin typeface="Calibri" pitchFamily="34" charset="0"/>
-                <a:ea typeface="MS PGothic" pitchFamily="34" charset="-128"/>
-              </a:defRPr>
-            </a:lvl4pPr>
-            <a:lvl5pPr marL="2057400" indent="-228600">
-              <a:defRPr sz="1200">
-                <a:solidFill>
-                  <a:schemeClr val="tx1"/>
-                </a:solidFill>
-                <a:latin typeface="Calibri" pitchFamily="34" charset="0"/>
-                <a:ea typeface="MS PGothic" pitchFamily="34" charset="-128"/>
-              </a:defRPr>
-            </a:lvl5pPr>
-            <a:lvl6pPr marL="2514600" indent="-228600" eaLnBrk="0" fontAlgn="base" hangingPunct="0">
-              <a:spcBef>
-                <a:spcPct val="30000"/>
-              </a:spcBef>
-              <a:spcAft>
-                <a:spcPct val="0"/>
-              </a:spcAft>
-              <a:defRPr sz="1200">
-                <a:solidFill>
-                  <a:schemeClr val="tx1"/>
-                </a:solidFill>
-                <a:latin typeface="Calibri" pitchFamily="34" charset="0"/>
-                <a:ea typeface="MS PGothic" pitchFamily="34" charset="-128"/>
-              </a:defRPr>
-            </a:lvl6pPr>
-            <a:lvl7pPr marL="2971800" indent="-228600" eaLnBrk="0" fontAlgn="base" hangingPunct="0">
-              <a:spcBef>
-                <a:spcPct val="30000"/>
-              </a:spcBef>
-              <a:spcAft>
-                <a:spcPct val="0"/>
-              </a:spcAft>
-              <a:defRPr sz="1200">
-                <a:solidFill>
-                  <a:schemeClr val="tx1"/>
-                </a:solidFill>
-                <a:latin typeface="Calibri" pitchFamily="34" charset="0"/>
-                <a:ea typeface="MS PGothic" pitchFamily="34" charset="-128"/>
-              </a:defRPr>
-            </a:lvl7pPr>
-            <a:lvl8pPr marL="3429000" indent="-228600" eaLnBrk="0" fontAlgn="base" hangingPunct="0">
-              <a:spcBef>
-                <a:spcPct val="30000"/>
-              </a:spcBef>
-              <a:spcAft>
-                <a:spcPct val="0"/>
-              </a:spcAft>
-              <a:defRPr sz="1200">
-                <a:solidFill>
-                  <a:schemeClr val="tx1"/>
-                </a:solidFill>
-                <a:latin typeface="Calibri" pitchFamily="34" charset="0"/>
-                <a:ea typeface="MS PGothic" pitchFamily="34" charset="-128"/>
-              </a:defRPr>
-            </a:lvl8pPr>
-            <a:lvl9pPr marL="3886200" indent="-228600" eaLnBrk="0" fontAlgn="base" hangingPunct="0">
-              <a:spcBef>
-                <a:spcPct val="30000"/>
-              </a:spcBef>
-              <a:spcAft>
-                <a:spcPct val="0"/>
-              </a:spcAft>
-              <a:defRPr sz="1200">
-                <a:solidFill>
-                  <a:schemeClr val="tx1"/>
-                </a:solidFill>
-                <a:latin typeface="Calibri" pitchFamily="34" charset="0"/>
-                <a:ea typeface="MS PGothic" pitchFamily="34" charset="-128"/>
-              </a:defRPr>
-            </a:lvl9pPr>
-          </a:lstStyle>
-          <a:p>
-            <a:fld id="{75B657BB-8A43-43EF-B341-E20B098F1267}" type="slidenum">
-              <a:rPr lang="en-US"/>
-              <a:pPr/>
-              <a:t>17</a:t>
-            </a:fld>
-            <a:endParaRPr lang="en-US" dirty="0"/>
-          </a:p>
-        </p:txBody>
-      </p:sp>
-    </p:spTree>
-    <p:extLst>
-      <p:ext uri="{BB962C8B-B14F-4D97-AF65-F5344CB8AC3E}">
-        <p14:creationId xmlns:p14="http://schemas.microsoft.com/office/powerpoint/2010/main" val="959014087"/>
-      </p:ext>
-    </p:extLst>
-  </p:cSld>
-  <p:clrMapOvr>
-    <a:masterClrMapping/>
-  </p:clrMapOvr>
-</p:notes>
-</file>
-
 <file path=ppt/notesSlides/notesSlide2.xml><?xml version="1.0" encoding="utf-8"?>
 <p:notes xmlns:a="http://schemas.openxmlformats.org/drawingml/2006/main" xmlns:r="http://schemas.openxmlformats.org/officeDocument/2006/relationships" xmlns:p="http://schemas.openxmlformats.org/presentationml/2006/main">
   <p:cSld>
@@ -3943,7 +3265,7 @@
           <a:p>
             <a:fld id="{CA66F131-B27C-7C4B-9D61-D276B291519F}" type="datetimeFigureOut">
               <a:rPr lang="en-US" smtClean="0"/>
-              <a:t>4/27/15</a:t>
+              <a:t>4/30/15</a:t>
             </a:fld>
             <a:endParaRPr lang="en-US"/>
           </a:p>
@@ -4113,7 +3435,7 @@
           <a:p>
             <a:fld id="{CA66F131-B27C-7C4B-9D61-D276B291519F}" type="datetimeFigureOut">
               <a:rPr lang="en-US" smtClean="0"/>
-              <a:t>4/27/15</a:t>
+              <a:t>4/30/15</a:t>
             </a:fld>
             <a:endParaRPr lang="en-US"/>
           </a:p>
@@ -4293,7 +3615,7 @@
           <a:p>
             <a:fld id="{CA66F131-B27C-7C4B-9D61-D276B291519F}" type="datetimeFigureOut">
               <a:rPr lang="en-US" smtClean="0"/>
-              <a:t>4/27/15</a:t>
+              <a:t>4/30/15</a:t>
             </a:fld>
             <a:endParaRPr lang="en-US"/>
           </a:p>
@@ -4911,7 +4233,7 @@
           <a:p>
             <a:fld id="{CA66F131-B27C-7C4B-9D61-D276B291519F}" type="datetimeFigureOut">
               <a:rPr lang="en-US" smtClean="0"/>
-              <a:t>4/27/15</a:t>
+              <a:t>4/30/15</a:t>
             </a:fld>
             <a:endParaRPr lang="en-US"/>
           </a:p>
@@ -4963,286 +4285,6 @@
     <p:extLst>
       <p:ext uri="{BB962C8B-B14F-4D97-AF65-F5344CB8AC3E}">
         <p14:creationId xmlns:p14="http://schemas.microsoft.com/office/powerpoint/2010/main" val="1659891277"/>
-      </p:ext>
-    </p:extLst>
-  </p:cSld>
-  <p:clrMapOvr>
-    <a:masterClrMapping/>
-  </p:clrMapOvr>
-</p:sldLayout>
-</file>
-
-<file path=ppt/slideLayouts/slideLayout20.xml><?xml version="1.0" encoding="utf-8"?>
-<p:sldLayout xmlns:a="http://schemas.openxmlformats.org/drawingml/2006/main" xmlns:r="http://schemas.openxmlformats.org/officeDocument/2006/relationships" xmlns:p="http://schemas.openxmlformats.org/presentationml/2006/main" userDrawn="1">
-  <p:cSld name="9_Title Slide">
-    <p:spTree>
-      <p:nvGrpSpPr>
-        <p:cNvPr id="1" name=""/>
-        <p:cNvGrpSpPr/>
-        <p:nvPr/>
-      </p:nvGrpSpPr>
-      <p:grpSpPr>
-        <a:xfrm>
-          <a:off x="0" y="0"/>
-          <a:ext cx="0" cy="0"/>
-          <a:chOff x="0" y="0"/>
-          <a:chExt cx="0" cy="0"/>
-        </a:xfrm>
-      </p:grpSpPr>
-      <p:sp>
-        <p:nvSpPr>
-          <p:cNvPr id="2" name="Footer Placeholder 4"/>
-          <p:cNvSpPr>
-            <a:spLocks noGrp="1"/>
-          </p:cNvSpPr>
-          <p:nvPr>
-            <p:ph type="ftr" sz="quarter" idx="10"/>
-          </p:nvPr>
-        </p:nvSpPr>
-        <p:spPr/>
-        <p:txBody>
-          <a:bodyPr/>
-          <a:lstStyle>
-            <a:lvl1pPr>
-              <a:defRPr/>
-            </a:lvl1pPr>
-          </a:lstStyle>
-          <a:p>
-            <a:pPr>
-              <a:defRPr/>
-            </a:pPr>
-            <a:endParaRPr lang="en-US"/>
-          </a:p>
-        </p:txBody>
-      </p:sp>
-    </p:spTree>
-    <p:extLst>
-      <p:ext uri="{BB962C8B-B14F-4D97-AF65-F5344CB8AC3E}">
-        <p14:creationId xmlns:p14="http://schemas.microsoft.com/office/powerpoint/2010/main" val="3314608896"/>
-      </p:ext>
-    </p:extLst>
-  </p:cSld>
-  <p:clrMapOvr>
-    <a:masterClrMapping/>
-  </p:clrMapOvr>
-</p:sldLayout>
-</file>
-
-<file path=ppt/slideLayouts/slideLayout21.xml><?xml version="1.0" encoding="utf-8"?>
-<p:sldLayout xmlns:a="http://schemas.openxmlformats.org/drawingml/2006/main" xmlns:r="http://schemas.openxmlformats.org/officeDocument/2006/relationships" xmlns:p="http://schemas.openxmlformats.org/presentationml/2006/main" userDrawn="1">
-  <p:cSld name="17_Title Slide">
-    <p:spTree>
-      <p:nvGrpSpPr>
-        <p:cNvPr id="1" name=""/>
-        <p:cNvGrpSpPr/>
-        <p:nvPr/>
-      </p:nvGrpSpPr>
-      <p:grpSpPr>
-        <a:xfrm>
-          <a:off x="0" y="0"/>
-          <a:ext cx="0" cy="0"/>
-          <a:chOff x="0" y="0"/>
-          <a:chExt cx="0" cy="0"/>
-        </a:xfrm>
-      </p:grpSpPr>
-      <p:sp>
-        <p:nvSpPr>
-          <p:cNvPr id="2" name="Footer Placeholder 4"/>
-          <p:cNvSpPr>
-            <a:spLocks noGrp="1"/>
-          </p:cNvSpPr>
-          <p:nvPr>
-            <p:ph type="ftr" sz="quarter" idx="10"/>
-          </p:nvPr>
-        </p:nvSpPr>
-        <p:spPr/>
-        <p:txBody>
-          <a:bodyPr/>
-          <a:lstStyle>
-            <a:lvl1pPr>
-              <a:defRPr/>
-            </a:lvl1pPr>
-          </a:lstStyle>
-          <a:p>
-            <a:pPr>
-              <a:defRPr/>
-            </a:pPr>
-            <a:endParaRPr lang="en-US"/>
-          </a:p>
-        </p:txBody>
-      </p:sp>
-    </p:spTree>
-    <p:extLst>
-      <p:ext uri="{BB962C8B-B14F-4D97-AF65-F5344CB8AC3E}">
-        <p14:creationId xmlns:p14="http://schemas.microsoft.com/office/powerpoint/2010/main" val="3141655779"/>
-      </p:ext>
-    </p:extLst>
-  </p:cSld>
-  <p:clrMapOvr>
-    <a:masterClrMapping/>
-  </p:clrMapOvr>
-</p:sldLayout>
-</file>
-
-<file path=ppt/slideLayouts/slideLayout22.xml><?xml version="1.0" encoding="utf-8"?>
-<p:sldLayout xmlns:a="http://schemas.openxmlformats.org/drawingml/2006/main" xmlns:r="http://schemas.openxmlformats.org/officeDocument/2006/relationships" xmlns:p="http://schemas.openxmlformats.org/presentationml/2006/main" userDrawn="1">
-  <p:cSld name="10_Title Slide">
-    <p:spTree>
-      <p:nvGrpSpPr>
-        <p:cNvPr id="1" name=""/>
-        <p:cNvGrpSpPr/>
-        <p:nvPr/>
-      </p:nvGrpSpPr>
-      <p:grpSpPr>
-        <a:xfrm>
-          <a:off x="0" y="0"/>
-          <a:ext cx="0" cy="0"/>
-          <a:chOff x="0" y="0"/>
-          <a:chExt cx="0" cy="0"/>
-        </a:xfrm>
-      </p:grpSpPr>
-      <p:sp>
-        <p:nvSpPr>
-          <p:cNvPr id="2" name="Footer Placeholder 4"/>
-          <p:cNvSpPr>
-            <a:spLocks noGrp="1"/>
-          </p:cNvSpPr>
-          <p:nvPr>
-            <p:ph type="ftr" sz="quarter" idx="10"/>
-          </p:nvPr>
-        </p:nvSpPr>
-        <p:spPr/>
-        <p:txBody>
-          <a:bodyPr/>
-          <a:lstStyle>
-            <a:lvl1pPr>
-              <a:defRPr/>
-            </a:lvl1pPr>
-          </a:lstStyle>
-          <a:p>
-            <a:pPr>
-              <a:defRPr/>
-            </a:pPr>
-            <a:endParaRPr lang="en-US"/>
-          </a:p>
-        </p:txBody>
-      </p:sp>
-    </p:spTree>
-    <p:extLst>
-      <p:ext uri="{BB962C8B-B14F-4D97-AF65-F5344CB8AC3E}">
-        <p14:creationId xmlns:p14="http://schemas.microsoft.com/office/powerpoint/2010/main" val="3314608896"/>
-      </p:ext>
-    </p:extLst>
-  </p:cSld>
-  <p:clrMapOvr>
-    <a:masterClrMapping/>
-  </p:clrMapOvr>
-</p:sldLayout>
-</file>
-
-<file path=ppt/slideLayouts/slideLayout23.xml><?xml version="1.0" encoding="utf-8"?>
-<p:sldLayout xmlns:a="http://schemas.openxmlformats.org/drawingml/2006/main" xmlns:r="http://schemas.openxmlformats.org/officeDocument/2006/relationships" xmlns:p="http://schemas.openxmlformats.org/presentationml/2006/main" userDrawn="1">
-  <p:cSld name="11_Title Slide">
-    <p:spTree>
-      <p:nvGrpSpPr>
-        <p:cNvPr id="1" name=""/>
-        <p:cNvGrpSpPr/>
-        <p:nvPr/>
-      </p:nvGrpSpPr>
-      <p:grpSpPr>
-        <a:xfrm>
-          <a:off x="0" y="0"/>
-          <a:ext cx="0" cy="0"/>
-          <a:chOff x="0" y="0"/>
-          <a:chExt cx="0" cy="0"/>
-        </a:xfrm>
-      </p:grpSpPr>
-      <p:sp>
-        <p:nvSpPr>
-          <p:cNvPr id="2" name="Footer Placeholder 4"/>
-          <p:cNvSpPr>
-            <a:spLocks noGrp="1"/>
-          </p:cNvSpPr>
-          <p:nvPr>
-            <p:ph type="ftr" sz="quarter" idx="10"/>
-          </p:nvPr>
-        </p:nvSpPr>
-        <p:spPr/>
-        <p:txBody>
-          <a:bodyPr/>
-          <a:lstStyle>
-            <a:lvl1pPr>
-              <a:defRPr/>
-            </a:lvl1pPr>
-          </a:lstStyle>
-          <a:p>
-            <a:pPr>
-              <a:defRPr/>
-            </a:pPr>
-            <a:endParaRPr lang="en-US"/>
-          </a:p>
-        </p:txBody>
-      </p:sp>
-    </p:spTree>
-    <p:extLst>
-      <p:ext uri="{BB962C8B-B14F-4D97-AF65-F5344CB8AC3E}">
-        <p14:creationId xmlns:p14="http://schemas.microsoft.com/office/powerpoint/2010/main" val="3314608896"/>
-      </p:ext>
-    </p:extLst>
-  </p:cSld>
-  <p:clrMapOvr>
-    <a:masterClrMapping/>
-  </p:clrMapOvr>
-</p:sldLayout>
-</file>
-
-<file path=ppt/slideLayouts/slideLayout24.xml><?xml version="1.0" encoding="utf-8"?>
-<p:sldLayout xmlns:a="http://schemas.openxmlformats.org/drawingml/2006/main" xmlns:r="http://schemas.openxmlformats.org/officeDocument/2006/relationships" xmlns:p="http://schemas.openxmlformats.org/presentationml/2006/main" userDrawn="1">
-  <p:cSld name="12_Title Slide">
-    <p:spTree>
-      <p:nvGrpSpPr>
-        <p:cNvPr id="1" name=""/>
-        <p:cNvGrpSpPr/>
-        <p:nvPr/>
-      </p:nvGrpSpPr>
-      <p:grpSpPr>
-        <a:xfrm>
-          <a:off x="0" y="0"/>
-          <a:ext cx="0" cy="0"/>
-          <a:chOff x="0" y="0"/>
-          <a:chExt cx="0" cy="0"/>
-        </a:xfrm>
-      </p:grpSpPr>
-      <p:sp>
-        <p:nvSpPr>
-          <p:cNvPr id="2" name="Footer Placeholder 4"/>
-          <p:cNvSpPr>
-            <a:spLocks noGrp="1"/>
-          </p:cNvSpPr>
-          <p:nvPr>
-            <p:ph type="ftr" sz="quarter" idx="10"/>
-          </p:nvPr>
-        </p:nvSpPr>
-        <p:spPr/>
-        <p:txBody>
-          <a:bodyPr/>
-          <a:lstStyle>
-            <a:lvl1pPr>
-              <a:defRPr/>
-            </a:lvl1pPr>
-          </a:lstStyle>
-          <a:p>
-            <a:pPr>
-              <a:defRPr/>
-            </a:pPr>
-            <a:endParaRPr lang="en-US"/>
-          </a:p>
-        </p:txBody>
-      </p:sp>
-    </p:spTree>
-    <p:extLst>
-      <p:ext uri="{BB962C8B-B14F-4D97-AF65-F5344CB8AC3E}">
-        <p14:creationId xmlns:p14="http://schemas.microsoft.com/office/powerpoint/2010/main" val="3314608896"/>
       </p:ext>
     </p:extLst>
   </p:cSld>
@@ -5437,7 +4479,7 @@
           <a:p>
             <a:fld id="{CA66F131-B27C-7C4B-9D61-D276B291519F}" type="datetimeFigureOut">
               <a:rPr lang="en-US" smtClean="0"/>
-              <a:t>4/27/15</a:t>
+              <a:t>4/30/15</a:t>
             </a:fld>
             <a:endParaRPr lang="en-US"/>
           </a:p>
@@ -5725,7 +4767,7 @@
           <a:p>
             <a:fld id="{CA66F131-B27C-7C4B-9D61-D276B291519F}" type="datetimeFigureOut">
               <a:rPr lang="en-US" smtClean="0"/>
-              <a:t>4/27/15</a:t>
+              <a:t>4/30/15</a:t>
             </a:fld>
             <a:endParaRPr lang="en-US"/>
           </a:p>
@@ -6147,7 +5189,7 @@
           <a:p>
             <a:fld id="{CA66F131-B27C-7C4B-9D61-D276B291519F}" type="datetimeFigureOut">
               <a:rPr lang="en-US" smtClean="0"/>
-              <a:t>4/27/15</a:t>
+              <a:t>4/30/15</a:t>
             </a:fld>
             <a:endParaRPr lang="en-US"/>
           </a:p>
@@ -6265,7 +5307,7 @@
           <a:p>
             <a:fld id="{CA66F131-B27C-7C4B-9D61-D276B291519F}" type="datetimeFigureOut">
               <a:rPr lang="en-US" smtClean="0"/>
-              <a:t>4/27/15</a:t>
+              <a:t>4/30/15</a:t>
             </a:fld>
             <a:endParaRPr lang="en-US"/>
           </a:p>
@@ -6360,7 +5402,7 @@
           <a:p>
             <a:fld id="{CA66F131-B27C-7C4B-9D61-D276B291519F}" type="datetimeFigureOut">
               <a:rPr lang="en-US" smtClean="0"/>
-              <a:t>4/27/15</a:t>
+              <a:t>4/30/15</a:t>
             </a:fld>
             <a:endParaRPr lang="en-US"/>
           </a:p>
@@ -6637,7 +5679,7 @@
           <a:p>
             <a:fld id="{CA66F131-B27C-7C4B-9D61-D276B291519F}" type="datetimeFigureOut">
               <a:rPr lang="en-US" smtClean="0"/>
-              <a:t>4/27/15</a:t>
+              <a:t>4/30/15</a:t>
             </a:fld>
             <a:endParaRPr lang="en-US"/>
           </a:p>
@@ -6890,7 +5932,7 @@
           <a:p>
             <a:fld id="{CA66F131-B27C-7C4B-9D61-D276B291519F}" type="datetimeFigureOut">
               <a:rPr lang="en-US" smtClean="0"/>
-              <a:t>4/27/15</a:t>
+              <a:t>4/30/15</a:t>
             </a:fld>
             <a:endParaRPr lang="en-US"/>
           </a:p>
@@ -7103,7 +6145,7 @@
           <a:p>
             <a:fld id="{CA66F131-B27C-7C4B-9D61-D276B291519F}" type="datetimeFigureOut">
               <a:rPr lang="en-US" smtClean="0"/>
-              <a:t>4/27/15</a:t>
+              <a:t>4/30/15</a:t>
             </a:fld>
             <a:endParaRPr lang="en-US"/>
           </a:p>
@@ -7215,11 +6257,6 @@
     <p:sldLayoutId id="2147483665" r:id="rId17"/>
     <p:sldLayoutId id="2147483666" r:id="rId18"/>
     <p:sldLayoutId id="2147483667" r:id="rId19"/>
-    <p:sldLayoutId id="2147483668" r:id="rId20"/>
-    <p:sldLayoutId id="2147483669" r:id="rId21"/>
-    <p:sldLayoutId id="2147483670" r:id="rId22"/>
-    <p:sldLayoutId id="2147483671" r:id="rId23"/>
-    <p:sldLayoutId id="2147483672" r:id="rId24"/>
   </p:sldLayoutIdLst>
   <p:txStyles>
     <p:titleStyle>
@@ -9966,1951 +9003,6 @@
     <p:extLst>
       <p:ext uri="{BB962C8B-B14F-4D97-AF65-F5344CB8AC3E}">
         <p14:creationId xmlns:p14="http://schemas.microsoft.com/office/powerpoint/2010/main" val="842106560"/>
-      </p:ext>
-    </p:extLst>
-  </p:cSld>
-  <p:clrMapOvr>
-    <a:masterClrMapping/>
-  </p:clrMapOvr>
-  <p:timing>
-    <p:tnLst>
-      <p:par>
-        <p:cTn xmlns:p14="http://schemas.microsoft.com/office/powerpoint/2010/main" id="1" dur="indefinite" restart="never" nodeType="tmRoot"/>
-      </p:par>
-    </p:tnLst>
-  </p:timing>
-</p:sld>
-</file>
-
-<file path=ppt/slides/slide13.xml><?xml version="1.0" encoding="utf-8"?>
-<p:sld xmlns:a="http://schemas.openxmlformats.org/drawingml/2006/main" xmlns:r="http://schemas.openxmlformats.org/officeDocument/2006/relationships" xmlns:p="http://schemas.openxmlformats.org/presentationml/2006/main">
-  <p:cSld>
-    <p:spTree>
-      <p:nvGrpSpPr>
-        <p:cNvPr id="1" name=""/>
-        <p:cNvGrpSpPr/>
-        <p:nvPr/>
-      </p:nvGrpSpPr>
-      <p:grpSpPr>
-        <a:xfrm>
-          <a:off x="0" y="0"/>
-          <a:ext cx="0" cy="0"/>
-          <a:chOff x="0" y="0"/>
-          <a:chExt cx="0" cy="0"/>
-        </a:xfrm>
-      </p:grpSpPr>
-      <p:sp>
-        <p:nvSpPr>
-          <p:cNvPr id="14338" name="Rectangle 6"/>
-          <p:cNvSpPr>
-            <a:spLocks noChangeArrowheads="1"/>
-          </p:cNvSpPr>
-          <p:nvPr/>
-        </p:nvSpPr>
-        <p:spPr bwMode="auto">
-          <a:xfrm>
-            <a:off x="1336675" y="387350"/>
-            <a:ext cx="6477000" cy="543739"/>
-          </a:xfrm>
-          <a:prstGeom prst="rect">
-            <a:avLst/>
-          </a:prstGeom>
-          <a:noFill/>
-          <a:ln w="28575">
-            <a:noFill/>
-            <a:miter lim="800000"/>
-            <a:headEnd/>
-            <a:tailEnd/>
-          </a:ln>
-        </p:spPr>
-        <p:txBody>
-          <a:bodyPr>
-            <a:spAutoFit/>
-          </a:bodyPr>
-          <a:lstStyle/>
-          <a:p>
-            <a:pPr algn="ctr">
-              <a:lnSpc>
-                <a:spcPct val="90000"/>
-              </a:lnSpc>
-              <a:spcBef>
-                <a:spcPct val="20000"/>
-              </a:spcBef>
-            </a:pPr>
-            <a:r>
-              <a:rPr lang="en-US" sz="3200" b="1" dirty="0">
-                <a:solidFill>
-                  <a:srgbClr val="002060"/>
-                </a:solidFill>
-              </a:rPr>
-              <a:t>Divine Code of Conduct  # </a:t>
-            </a:r>
-            <a:r>
-              <a:rPr lang="en-US" sz="3200" b="1" dirty="0" smtClean="0">
-                <a:solidFill>
-                  <a:srgbClr val="002060"/>
-                </a:solidFill>
-              </a:rPr>
-              <a:t>3</a:t>
-            </a:r>
-            <a:endParaRPr lang="en-US" sz="3600" b="1" dirty="0">
-              <a:solidFill>
-                <a:srgbClr val="002060"/>
-              </a:solidFill>
-            </a:endParaRPr>
-          </a:p>
-        </p:txBody>
-      </p:sp>
-      <p:sp>
-        <p:nvSpPr>
-          <p:cNvPr id="14339" name="Rectangle 11"/>
-          <p:cNvSpPr>
-            <a:spLocks noChangeArrowheads="1"/>
-          </p:cNvSpPr>
-          <p:nvPr/>
-        </p:nvSpPr>
-        <p:spPr bwMode="auto">
-          <a:xfrm>
-            <a:off x="3009900" y="5943600"/>
-            <a:ext cx="3130550" cy="533400"/>
-          </a:xfrm>
-          <a:prstGeom prst="rect">
-            <a:avLst/>
-          </a:prstGeom>
-          <a:noFill/>
-          <a:ln w="9525">
-            <a:noFill/>
-            <a:miter lim="800000"/>
-            <a:headEnd/>
-            <a:tailEnd/>
-          </a:ln>
-        </p:spPr>
-        <p:txBody>
-          <a:bodyPr/>
-          <a:lstStyle/>
-          <a:p>
-            <a:pPr algn="ctr">
-              <a:spcBef>
-                <a:spcPct val="20000"/>
-              </a:spcBef>
-            </a:pPr>
-            <a:r>
-              <a:rPr lang="en-US" sz="2400" b="1">
-                <a:solidFill>
-                  <a:srgbClr val="FF0000"/>
-                </a:solidFill>
-                <a:cs typeface="Times New Roman" pitchFamily="18" charset="0"/>
-              </a:rPr>
-              <a:t>Thought for the week</a:t>
-            </a:r>
-          </a:p>
-        </p:txBody>
-      </p:sp>
-      <p:sp>
-        <p:nvSpPr>
-          <p:cNvPr id="14340" name="Rectangle 3"/>
-          <p:cNvSpPr>
-            <a:spLocks noChangeArrowheads="1"/>
-          </p:cNvSpPr>
-          <p:nvPr/>
-        </p:nvSpPr>
-        <p:spPr bwMode="auto">
-          <a:xfrm>
-            <a:off x="762000" y="1981200"/>
-            <a:ext cx="7696200" cy="1200329"/>
-          </a:xfrm>
-          <a:prstGeom prst="rect">
-            <a:avLst/>
-          </a:prstGeom>
-          <a:noFill/>
-          <a:ln w="9525">
-            <a:noFill/>
-            <a:miter lim="800000"/>
-            <a:headEnd/>
-            <a:tailEnd/>
-          </a:ln>
-        </p:spPr>
-        <p:txBody>
-          <a:bodyPr>
-            <a:spAutoFit/>
-          </a:bodyPr>
-          <a:lstStyle/>
-          <a:p>
-            <a:r>
-              <a:rPr lang="en-US" sz="3600" b="1" dirty="0" smtClean="0">
-                <a:solidFill>
-                  <a:srgbClr val="002060"/>
-                </a:solidFill>
-              </a:rPr>
-              <a:t>Participation in </a:t>
-            </a:r>
-            <a:r>
-              <a:rPr lang="en-US" sz="3600" b="1" dirty="0" err="1" smtClean="0">
-                <a:solidFill>
-                  <a:srgbClr val="002060"/>
-                </a:solidFill>
-              </a:rPr>
-              <a:t>Sai</a:t>
-            </a:r>
-            <a:r>
-              <a:rPr lang="en-US" sz="3600" b="1" dirty="0" smtClean="0">
-                <a:solidFill>
-                  <a:srgbClr val="002060"/>
-                </a:solidFill>
-              </a:rPr>
-              <a:t> Spiritual Education by children of the family.</a:t>
-            </a:r>
-            <a:endParaRPr lang="en-US" sz="3600" b="1" dirty="0">
-              <a:solidFill>
-                <a:srgbClr val="002060"/>
-              </a:solidFill>
-            </a:endParaRPr>
-          </a:p>
-        </p:txBody>
-      </p:sp>
-    </p:spTree>
-    <p:extLst>
-      <p:ext uri="{BB962C8B-B14F-4D97-AF65-F5344CB8AC3E}">
-        <p14:creationId xmlns:p14="http://schemas.microsoft.com/office/powerpoint/2010/main" val="1181991806"/>
-      </p:ext>
-    </p:extLst>
-  </p:cSld>
-  <p:clrMapOvr>
-    <a:masterClrMapping/>
-  </p:clrMapOvr>
-  <p:timing>
-    <p:tnLst>
-      <p:par>
-        <p:cTn xmlns:p14="http://schemas.microsoft.com/office/powerpoint/2010/main" id="1" dur="indefinite" restart="never" nodeType="tmRoot"/>
-      </p:par>
-    </p:tnLst>
-  </p:timing>
-</p:sld>
-</file>
-
-<file path=ppt/slides/slide14.xml><?xml version="1.0" encoding="utf-8"?>
-<p:sld xmlns:a="http://schemas.openxmlformats.org/drawingml/2006/main" xmlns:r="http://schemas.openxmlformats.org/officeDocument/2006/relationships" xmlns:p="http://schemas.openxmlformats.org/presentationml/2006/main">
-  <p:cSld>
-    <p:spTree>
-      <p:nvGrpSpPr>
-        <p:cNvPr id="1" name=""/>
-        <p:cNvGrpSpPr/>
-        <p:nvPr/>
-      </p:nvGrpSpPr>
-      <p:grpSpPr>
-        <a:xfrm>
-          <a:off x="0" y="0"/>
-          <a:ext cx="0" cy="0"/>
-          <a:chOff x="0" y="0"/>
-          <a:chExt cx="0" cy="0"/>
-        </a:xfrm>
-      </p:grpSpPr>
-      <p:sp>
-        <p:nvSpPr>
-          <p:cNvPr id="33795" name="Rectangle 6"/>
-          <p:cNvSpPr>
-            <a:spLocks noChangeArrowheads="1"/>
-          </p:cNvSpPr>
-          <p:nvPr/>
-        </p:nvSpPr>
-        <p:spPr bwMode="auto">
-          <a:xfrm>
-            <a:off x="1333500" y="76200"/>
-            <a:ext cx="6477000" cy="479425"/>
-          </a:xfrm>
-          <a:prstGeom prst="rect">
-            <a:avLst/>
-          </a:prstGeom>
-          <a:noFill/>
-          <a:ln w="28575">
-            <a:noFill/>
-            <a:miter lim="800000"/>
-            <a:headEnd/>
-            <a:tailEnd/>
-          </a:ln>
-        </p:spPr>
-        <p:txBody>
-          <a:bodyPr>
-            <a:spAutoFit/>
-          </a:bodyPr>
-          <a:lstStyle/>
-          <a:p>
-            <a:pPr algn="ctr" eaLnBrk="1" hangingPunct="1">
-              <a:lnSpc>
-                <a:spcPct val="90000"/>
-              </a:lnSpc>
-              <a:spcBef>
-                <a:spcPct val="20000"/>
-              </a:spcBef>
-              <a:defRPr/>
-            </a:pPr>
-            <a:r>
-              <a:rPr lang="en-US" sz="2800" b="1" dirty="0">
-                <a:solidFill>
-                  <a:srgbClr val="002060"/>
-                </a:solidFill>
-                <a:latin typeface="+mn-lt"/>
-                <a:ea typeface="ＭＳ Ｐゴシック" charset="0"/>
-                <a:cs typeface="Andalus" pitchFamily="2" charset="-78"/>
-              </a:rPr>
-              <a:t>Thought for the week</a:t>
-            </a:r>
-            <a:endParaRPr lang="en-US" sz="3200" b="1" dirty="0">
-              <a:solidFill>
-                <a:srgbClr val="002060"/>
-              </a:solidFill>
-              <a:latin typeface="+mn-lt"/>
-              <a:ea typeface="ＭＳ Ｐゴシック" charset="0"/>
-              <a:cs typeface="Andalus" pitchFamily="2" charset="-78"/>
-            </a:endParaRPr>
-          </a:p>
-        </p:txBody>
-      </p:sp>
-      <p:sp>
-        <p:nvSpPr>
-          <p:cNvPr id="53251" name="Rectangle 10"/>
-          <p:cNvSpPr>
-            <a:spLocks noChangeArrowheads="1"/>
-          </p:cNvSpPr>
-          <p:nvPr/>
-        </p:nvSpPr>
-        <p:spPr bwMode="auto">
-          <a:xfrm>
-            <a:off x="152400" y="809685"/>
-            <a:ext cx="8839200" cy="5601533"/>
-          </a:xfrm>
-          <a:prstGeom prst="rect">
-            <a:avLst/>
-          </a:prstGeom>
-          <a:noFill/>
-          <a:ln w="9525">
-            <a:noFill/>
-            <a:miter lim="800000"/>
-            <a:headEnd/>
-            <a:tailEnd/>
-          </a:ln>
-        </p:spPr>
-        <p:txBody>
-          <a:bodyPr wrap="square">
-            <a:spAutoFit/>
-          </a:bodyPr>
-          <a:lstStyle/>
-          <a:p>
-            <a:pPr algn="just" eaLnBrk="1" hangingPunct="1"/>
-            <a:r>
-              <a:rPr lang="en-US" sz="2400" b="1" dirty="0">
-                <a:solidFill>
-                  <a:srgbClr val="002060"/>
-                </a:solidFill>
-              </a:rPr>
-              <a:t>The bookish knowledge that many feverishly acquire is relevant only for the day of the exam. As you enter your professions armed with this knowledge, you will soon discover that you only have superficial knowledge on any subject and your general knowledge is almost zero. Without general knowledge and practical wisdom, you cannot discriminate. World today needs practical knowledge. Water is formed from two parts of hydrogen and one part of oxygen. You can prove this in the laboratory. But when you sit for lunch, do you mix two parts of hydrogen and one part of oxygen to drink water? By sipping just a drop, you can even comment on the purity of the water and its taste. Thus discrimination and general knowledge is very essential to make sure your daily life and behavior does not have any lapses. You must experience the enjoyable life in the right way at the right time</a:t>
-            </a:r>
-            <a:r>
-              <a:rPr lang="en-US" sz="2400" b="1" dirty="0" smtClean="0">
-                <a:solidFill>
-                  <a:srgbClr val="002060"/>
-                </a:solidFill>
-              </a:rPr>
-              <a:t>.</a:t>
-            </a:r>
-            <a:endParaRPr lang="en-US" sz="2400" b="1" dirty="0">
-              <a:solidFill>
-                <a:srgbClr val="002060"/>
-              </a:solidFill>
-            </a:endParaRPr>
-          </a:p>
-          <a:p>
-            <a:pPr algn="just" eaLnBrk="1" hangingPunct="1"/>
-            <a:r>
-              <a:rPr lang="en-US" sz="2200" b="1" i="1" dirty="0">
-                <a:solidFill>
-                  <a:srgbClr val="002060"/>
-                </a:solidFill>
-              </a:rPr>
-              <a:t>- </a:t>
-            </a:r>
-            <a:r>
-              <a:rPr lang="en-US" sz="2200" i="1" dirty="0">
-                <a:solidFill>
-                  <a:srgbClr val="002060"/>
-                </a:solidFill>
-              </a:rPr>
-              <a:t>Divine Discourse, 'My Dear Students', Vol 3, </a:t>
-            </a:r>
-            <a:r>
-              <a:rPr lang="en-US" sz="2200" i="1" dirty="0" err="1">
-                <a:solidFill>
-                  <a:srgbClr val="002060"/>
-                </a:solidFill>
-              </a:rPr>
-              <a:t>Ch</a:t>
-            </a:r>
-            <a:r>
-              <a:rPr lang="en-US" sz="2200" i="1" dirty="0">
-                <a:solidFill>
-                  <a:srgbClr val="002060"/>
-                </a:solidFill>
-              </a:rPr>
-              <a:t> 4, Jun 21, 1989</a:t>
-            </a:r>
-            <a:r>
-              <a:rPr lang="en-US" sz="2200" i="1" dirty="0" smtClean="0">
-                <a:solidFill>
-                  <a:srgbClr val="002060"/>
-                </a:solidFill>
-              </a:rPr>
-              <a:t>. --  BABA</a:t>
-            </a:r>
-            <a:endParaRPr lang="en-US" altLang="en-US" sz="2200" i="1" dirty="0">
-              <a:solidFill>
-                <a:srgbClr val="002060"/>
-              </a:solidFill>
-            </a:endParaRPr>
-          </a:p>
-        </p:txBody>
-      </p:sp>
-      <p:sp>
-        <p:nvSpPr>
-          <p:cNvPr id="53252" name="Rectangle 11"/>
-          <p:cNvSpPr>
-            <a:spLocks noChangeArrowheads="1"/>
-          </p:cNvSpPr>
-          <p:nvPr/>
-        </p:nvSpPr>
-        <p:spPr bwMode="auto">
-          <a:xfrm>
-            <a:off x="3276600" y="6400800"/>
-            <a:ext cx="2819400" cy="381000"/>
-          </a:xfrm>
-          <a:prstGeom prst="rect">
-            <a:avLst/>
-          </a:prstGeom>
-          <a:noFill/>
-          <a:ln w="9525">
-            <a:noFill/>
-            <a:miter lim="800000"/>
-            <a:headEnd/>
-            <a:tailEnd/>
-          </a:ln>
-        </p:spPr>
-        <p:txBody>
-          <a:bodyPr/>
-          <a:lstStyle/>
-          <a:p>
-            <a:pPr algn="ctr" eaLnBrk="1" hangingPunct="1">
-              <a:spcBef>
-                <a:spcPct val="20000"/>
-              </a:spcBef>
-            </a:pPr>
-            <a:r>
-              <a:rPr lang="en-US" sz="2400" b="1" dirty="0">
-                <a:solidFill>
-                  <a:srgbClr val="FF0000"/>
-                </a:solidFill>
-              </a:rPr>
-              <a:t>From Untruth……</a:t>
-            </a:r>
-          </a:p>
-        </p:txBody>
-      </p:sp>
-    </p:spTree>
-    <p:extLst>
-      <p:ext uri="{BB962C8B-B14F-4D97-AF65-F5344CB8AC3E}">
-        <p14:creationId xmlns:p14="http://schemas.microsoft.com/office/powerpoint/2010/main" val="2118841114"/>
-      </p:ext>
-    </p:extLst>
-  </p:cSld>
-  <p:clrMapOvr>
-    <a:masterClrMapping/>
-  </p:clrMapOvr>
-  <p:transition xmlns:p14="http://schemas.microsoft.com/office/powerpoint/2010/main" spd="med">
-    <p:fade/>
-  </p:transition>
-  <p:timing>
-    <p:tnLst>
-      <p:par>
-        <p:cTn xmlns:p14="http://schemas.microsoft.com/office/powerpoint/2010/main" id="1" dur="indefinite" restart="never" nodeType="tmRoot"/>
-      </p:par>
-    </p:tnLst>
-  </p:timing>
-</p:sld>
-</file>
-
-<file path=ppt/slides/slide15.xml><?xml version="1.0" encoding="utf-8"?>
-<p:sld xmlns:a="http://schemas.openxmlformats.org/drawingml/2006/main" xmlns:r="http://schemas.openxmlformats.org/officeDocument/2006/relationships" xmlns:p="http://schemas.openxmlformats.org/presentationml/2006/main">
-  <p:cSld>
-    <p:spTree>
-      <p:nvGrpSpPr>
-        <p:cNvPr id="1" name=""/>
-        <p:cNvGrpSpPr/>
-        <p:nvPr/>
-      </p:nvGrpSpPr>
-      <p:grpSpPr>
-        <a:xfrm>
-          <a:off x="0" y="0"/>
-          <a:ext cx="0" cy="0"/>
-          <a:chOff x="0" y="0"/>
-          <a:chExt cx="0" cy="0"/>
-        </a:xfrm>
-      </p:grpSpPr>
-      <p:sp>
-        <p:nvSpPr>
-          <p:cNvPr id="55298" name="Rectangle 14"/>
-          <p:cNvSpPr>
-            <a:spLocks noChangeArrowheads="1"/>
-          </p:cNvSpPr>
-          <p:nvPr/>
-        </p:nvSpPr>
-        <p:spPr bwMode="auto">
-          <a:xfrm>
-            <a:off x="442913" y="990600"/>
-            <a:ext cx="8283575" cy="1905000"/>
-          </a:xfrm>
-          <a:prstGeom prst="rect">
-            <a:avLst/>
-          </a:prstGeom>
-          <a:noFill/>
-          <a:ln w="9525">
-            <a:noFill/>
-            <a:miter lim="800000"/>
-            <a:headEnd/>
-            <a:tailEnd/>
-          </a:ln>
-        </p:spPr>
-        <p:txBody>
-          <a:bodyPr/>
-          <a:lstStyle/>
-          <a:p>
-            <a:pPr algn="ctr" eaLnBrk="1" hangingPunct="1">
-              <a:spcBef>
-                <a:spcPts val="600"/>
-              </a:spcBef>
-            </a:pPr>
-            <a:r>
-              <a:rPr lang="en-US" sz="3200" b="1" dirty="0">
-                <a:solidFill>
-                  <a:srgbClr val="002060"/>
-                </a:solidFill>
-              </a:rPr>
-              <a:t>From untruth, lead us to Truth</a:t>
-            </a:r>
-          </a:p>
-          <a:p>
-            <a:pPr algn="ctr" eaLnBrk="1" hangingPunct="1">
-              <a:spcBef>
-                <a:spcPts val="600"/>
-              </a:spcBef>
-            </a:pPr>
-            <a:r>
-              <a:rPr lang="en-US" sz="3200" b="1" dirty="0">
-                <a:solidFill>
-                  <a:srgbClr val="002060"/>
-                </a:solidFill>
-              </a:rPr>
-              <a:t>From the darkness, lead us to the Light</a:t>
-            </a:r>
-          </a:p>
-          <a:p>
-            <a:pPr algn="ctr" eaLnBrk="1" hangingPunct="1">
-              <a:spcBef>
-                <a:spcPts val="600"/>
-              </a:spcBef>
-            </a:pPr>
-            <a:r>
-              <a:rPr lang="en-US" sz="3200" b="1" dirty="0">
-                <a:solidFill>
-                  <a:srgbClr val="002060"/>
-                </a:solidFill>
-              </a:rPr>
-              <a:t>From death, to immortality</a:t>
-            </a:r>
-          </a:p>
-          <a:p>
-            <a:pPr algn="ctr" eaLnBrk="1" hangingPunct="1">
-              <a:spcBef>
-                <a:spcPct val="20000"/>
-              </a:spcBef>
-            </a:pPr>
-            <a:endParaRPr lang="en-US" sz="3600" b="1" dirty="0">
-              <a:solidFill>
-                <a:srgbClr val="002060"/>
-              </a:solidFill>
-            </a:endParaRPr>
-          </a:p>
-        </p:txBody>
-      </p:sp>
-      <p:sp>
-        <p:nvSpPr>
-          <p:cNvPr id="55299" name="Rectangle 15"/>
-          <p:cNvSpPr>
-            <a:spLocks noChangeArrowheads="1"/>
-          </p:cNvSpPr>
-          <p:nvPr/>
-        </p:nvSpPr>
-        <p:spPr bwMode="auto">
-          <a:xfrm>
-            <a:off x="341313" y="3200400"/>
-            <a:ext cx="8486775" cy="2590800"/>
-          </a:xfrm>
-          <a:prstGeom prst="rect">
-            <a:avLst/>
-          </a:prstGeom>
-          <a:noFill/>
-          <a:ln w="9525">
-            <a:noFill/>
-            <a:miter lim="800000"/>
-            <a:headEnd/>
-            <a:tailEnd/>
-          </a:ln>
-        </p:spPr>
-        <p:txBody>
-          <a:bodyPr/>
-          <a:lstStyle/>
-          <a:p>
-            <a:pPr algn="ctr" eaLnBrk="1" hangingPunct="1">
-              <a:spcBef>
-                <a:spcPts val="600"/>
-              </a:spcBef>
-            </a:pPr>
-            <a:r>
-              <a:rPr lang="en-US" sz="3200" b="1">
-                <a:solidFill>
-                  <a:srgbClr val="002060"/>
-                </a:solidFill>
-              </a:rPr>
-              <a:t>Asatoma Sadgamaya</a:t>
-            </a:r>
-          </a:p>
-          <a:p>
-            <a:pPr algn="ctr" eaLnBrk="1" hangingPunct="1">
-              <a:spcBef>
-                <a:spcPts val="600"/>
-              </a:spcBef>
-            </a:pPr>
-            <a:r>
-              <a:rPr lang="en-US" sz="3200" b="1">
-                <a:solidFill>
-                  <a:srgbClr val="002060"/>
-                </a:solidFill>
-              </a:rPr>
-              <a:t>Tamasoma Jyotirgamaya</a:t>
-            </a:r>
-          </a:p>
-          <a:p>
-            <a:pPr algn="ctr" eaLnBrk="1" hangingPunct="1">
-              <a:spcBef>
-                <a:spcPts val="600"/>
-              </a:spcBef>
-            </a:pPr>
-            <a:r>
-              <a:rPr lang="en-US" sz="3200" b="1">
-                <a:solidFill>
-                  <a:srgbClr val="002060"/>
-                </a:solidFill>
-              </a:rPr>
-              <a:t>Mrityorma Amritangamaya</a:t>
-            </a:r>
-          </a:p>
-          <a:p>
-            <a:pPr algn="ctr" eaLnBrk="1" hangingPunct="1">
-              <a:spcBef>
-                <a:spcPts val="600"/>
-              </a:spcBef>
-            </a:pPr>
-            <a:r>
-              <a:rPr lang="en-US" sz="3200" b="1">
-                <a:solidFill>
-                  <a:srgbClr val="002060"/>
-                </a:solidFill>
-              </a:rPr>
-              <a:t>Om Shanti Shanti Shantihi</a:t>
-            </a:r>
-          </a:p>
-          <a:p>
-            <a:pPr algn="ctr" eaLnBrk="1" hangingPunct="1">
-              <a:spcBef>
-                <a:spcPct val="20000"/>
-              </a:spcBef>
-            </a:pPr>
-            <a:endParaRPr lang="en-US" sz="3200" b="1" i="1">
-              <a:solidFill>
-                <a:srgbClr val="002060"/>
-              </a:solidFill>
-            </a:endParaRPr>
-          </a:p>
-        </p:txBody>
-      </p:sp>
-      <p:sp>
-        <p:nvSpPr>
-          <p:cNvPr id="55300" name="Rectangle 11"/>
-          <p:cNvSpPr>
-            <a:spLocks noChangeArrowheads="1"/>
-          </p:cNvSpPr>
-          <p:nvPr/>
-        </p:nvSpPr>
-        <p:spPr bwMode="auto">
-          <a:xfrm>
-            <a:off x="2959100" y="6172200"/>
-            <a:ext cx="3252788" cy="368300"/>
-          </a:xfrm>
-          <a:prstGeom prst="rect">
-            <a:avLst/>
-          </a:prstGeom>
-          <a:noFill/>
-          <a:ln w="9525">
-            <a:noFill/>
-            <a:miter lim="800000"/>
-            <a:headEnd/>
-            <a:tailEnd/>
-          </a:ln>
-        </p:spPr>
-        <p:txBody>
-          <a:bodyPr/>
-          <a:lstStyle/>
-          <a:p>
-            <a:pPr algn="ctr" eaLnBrk="1" hangingPunct="1">
-              <a:spcBef>
-                <a:spcPct val="20000"/>
-              </a:spcBef>
-            </a:pPr>
-            <a:r>
-              <a:rPr lang="en-US" sz="2400" b="1">
-                <a:solidFill>
-                  <a:srgbClr val="FF0000"/>
-                </a:solidFill>
-              </a:rPr>
-              <a:t>May all the beings</a:t>
-            </a:r>
-          </a:p>
-        </p:txBody>
-      </p:sp>
-      <p:sp>
-        <p:nvSpPr>
-          <p:cNvPr id="55301" name="Rectangle 11"/>
-          <p:cNvSpPr>
-            <a:spLocks noChangeArrowheads="1"/>
-          </p:cNvSpPr>
-          <p:nvPr/>
-        </p:nvSpPr>
-        <p:spPr bwMode="auto">
-          <a:xfrm>
-            <a:off x="3746500" y="304800"/>
-            <a:ext cx="1676400" cy="533400"/>
-          </a:xfrm>
-          <a:prstGeom prst="rect">
-            <a:avLst/>
-          </a:prstGeom>
-          <a:noFill/>
-          <a:ln w="9525">
-            <a:noFill/>
-            <a:miter lim="800000"/>
-            <a:headEnd/>
-            <a:tailEnd/>
-          </a:ln>
-        </p:spPr>
-        <p:txBody>
-          <a:bodyPr/>
-          <a:lstStyle/>
-          <a:p>
-            <a:pPr algn="ctr" eaLnBrk="1" hangingPunct="1">
-              <a:spcBef>
-                <a:spcPct val="20000"/>
-              </a:spcBef>
-            </a:pPr>
-            <a:r>
-              <a:rPr lang="en-US" sz="3200" b="1" i="1">
-                <a:solidFill>
-                  <a:srgbClr val="0000FF"/>
-                </a:solidFill>
-              </a:rPr>
-              <a:t>UNISON</a:t>
-            </a:r>
-          </a:p>
-        </p:txBody>
-      </p:sp>
-    </p:spTree>
-    <p:extLst>
-      <p:ext uri="{BB962C8B-B14F-4D97-AF65-F5344CB8AC3E}">
-        <p14:creationId xmlns:p14="http://schemas.microsoft.com/office/powerpoint/2010/main" val="5913315"/>
-      </p:ext>
-    </p:extLst>
-  </p:cSld>
-  <p:clrMapOvr>
-    <a:masterClrMapping/>
-  </p:clrMapOvr>
-  <p:timing>
-    <p:tnLst>
-      <p:par>
-        <p:cTn xmlns:p14="http://schemas.microsoft.com/office/powerpoint/2010/main" id="1" dur="indefinite" restart="never" nodeType="tmRoot"/>
-      </p:par>
-    </p:tnLst>
-  </p:timing>
-</p:sld>
-</file>
-
-<file path=ppt/slides/slide16.xml><?xml version="1.0" encoding="utf-8"?>
-<p:sld xmlns:a="http://schemas.openxmlformats.org/drawingml/2006/main" xmlns:r="http://schemas.openxmlformats.org/officeDocument/2006/relationships" xmlns:p="http://schemas.openxmlformats.org/presentationml/2006/main">
-  <p:cSld>
-    <p:spTree>
-      <p:nvGrpSpPr>
-        <p:cNvPr id="1" name=""/>
-        <p:cNvGrpSpPr/>
-        <p:nvPr/>
-      </p:nvGrpSpPr>
-      <p:grpSpPr>
-        <a:xfrm>
-          <a:off x="0" y="0"/>
-          <a:ext cx="0" cy="0"/>
-          <a:chOff x="0" y="0"/>
-          <a:chExt cx="0" cy="0"/>
-        </a:xfrm>
-      </p:grpSpPr>
-      <p:sp>
-        <p:nvSpPr>
-          <p:cNvPr id="56322" name="Rectangle 14"/>
-          <p:cNvSpPr>
-            <a:spLocks noChangeArrowheads="1"/>
-          </p:cNvSpPr>
-          <p:nvPr/>
-        </p:nvSpPr>
-        <p:spPr bwMode="auto">
-          <a:xfrm>
-            <a:off x="533400" y="990600"/>
-            <a:ext cx="8001000" cy="1371600"/>
-          </a:xfrm>
-          <a:prstGeom prst="rect">
-            <a:avLst/>
-          </a:prstGeom>
-          <a:noFill/>
-          <a:ln w="9525">
-            <a:noFill/>
-            <a:miter lim="800000"/>
-            <a:headEnd/>
-            <a:tailEnd/>
-          </a:ln>
-        </p:spPr>
-        <p:txBody>
-          <a:bodyPr/>
-          <a:lstStyle/>
-          <a:p>
-            <a:pPr algn="ctr" eaLnBrk="1" hangingPunct="1">
-              <a:spcBef>
-                <a:spcPct val="20000"/>
-              </a:spcBef>
-            </a:pPr>
-            <a:r>
-              <a:rPr lang="en-US" sz="3200" b="1" dirty="0">
-                <a:solidFill>
-                  <a:srgbClr val="002060"/>
-                </a:solidFill>
-              </a:rPr>
-              <a:t>May All The Beings In All The Worlds Have Happiness And Peace.</a:t>
-            </a:r>
-          </a:p>
-        </p:txBody>
-      </p:sp>
-      <p:sp>
-        <p:nvSpPr>
-          <p:cNvPr id="56323" name="Rectangle 15"/>
-          <p:cNvSpPr>
-            <a:spLocks noChangeArrowheads="1"/>
-          </p:cNvSpPr>
-          <p:nvPr/>
-        </p:nvSpPr>
-        <p:spPr bwMode="auto">
-          <a:xfrm>
-            <a:off x="533400" y="2895600"/>
-            <a:ext cx="8001000" cy="2057400"/>
-          </a:xfrm>
-          <a:prstGeom prst="rect">
-            <a:avLst/>
-          </a:prstGeom>
-          <a:noFill/>
-          <a:ln w="9525">
-            <a:noFill/>
-            <a:miter lim="800000"/>
-            <a:headEnd/>
-            <a:tailEnd/>
-          </a:ln>
-        </p:spPr>
-        <p:txBody>
-          <a:bodyPr/>
-          <a:lstStyle/>
-          <a:p>
-            <a:pPr algn="ctr" eaLnBrk="1" hangingPunct="1">
-              <a:spcBef>
-                <a:spcPct val="20000"/>
-              </a:spcBef>
-            </a:pPr>
-            <a:r>
-              <a:rPr lang="en-US" sz="3200" b="1">
-                <a:solidFill>
-                  <a:srgbClr val="002060"/>
-                </a:solidFill>
-              </a:rPr>
-              <a:t>Samastha Lokah </a:t>
-            </a:r>
-          </a:p>
-          <a:p>
-            <a:pPr algn="ctr" eaLnBrk="1" hangingPunct="1">
-              <a:spcBef>
-                <a:spcPct val="20000"/>
-              </a:spcBef>
-            </a:pPr>
-            <a:r>
-              <a:rPr lang="en-US" sz="3200" b="1">
-                <a:solidFill>
-                  <a:srgbClr val="002060"/>
-                </a:solidFill>
-              </a:rPr>
-              <a:t>Sukhino Bhavantu (3X)</a:t>
-            </a:r>
-          </a:p>
-          <a:p>
-            <a:pPr algn="ctr" eaLnBrk="1" hangingPunct="1">
-              <a:spcBef>
-                <a:spcPct val="20000"/>
-              </a:spcBef>
-            </a:pPr>
-            <a:r>
-              <a:rPr lang="en-US" sz="3200" b="1">
-                <a:solidFill>
-                  <a:srgbClr val="002060"/>
-                </a:solidFill>
-              </a:rPr>
-              <a:t>Om Shanti Shanti Shantihi!</a:t>
-            </a:r>
-            <a:endParaRPr lang="en-US" sz="3200" b="1" i="1">
-              <a:solidFill>
-                <a:srgbClr val="002060"/>
-              </a:solidFill>
-            </a:endParaRPr>
-          </a:p>
-        </p:txBody>
-      </p:sp>
-      <p:sp>
-        <p:nvSpPr>
-          <p:cNvPr id="56324" name="Rectangle 11"/>
-          <p:cNvSpPr>
-            <a:spLocks noChangeArrowheads="1"/>
-          </p:cNvSpPr>
-          <p:nvPr/>
-        </p:nvSpPr>
-        <p:spPr bwMode="auto">
-          <a:xfrm>
-            <a:off x="3695700" y="304800"/>
-            <a:ext cx="1676400" cy="533400"/>
-          </a:xfrm>
-          <a:prstGeom prst="rect">
-            <a:avLst/>
-          </a:prstGeom>
-          <a:noFill/>
-          <a:ln w="9525">
-            <a:noFill/>
-            <a:miter lim="800000"/>
-            <a:headEnd/>
-            <a:tailEnd/>
-          </a:ln>
-        </p:spPr>
-        <p:txBody>
-          <a:bodyPr/>
-          <a:lstStyle/>
-          <a:p>
-            <a:pPr algn="ctr" eaLnBrk="1" hangingPunct="1">
-              <a:spcBef>
-                <a:spcPct val="20000"/>
-              </a:spcBef>
-            </a:pPr>
-            <a:r>
-              <a:rPr lang="en-US" sz="3200" b="1" i="1">
-                <a:solidFill>
-                  <a:srgbClr val="0000FF"/>
-                </a:solidFill>
-              </a:rPr>
-              <a:t>UNISON</a:t>
-            </a:r>
-          </a:p>
-        </p:txBody>
-      </p:sp>
-      <p:sp>
-        <p:nvSpPr>
-          <p:cNvPr id="56325" name="Rectangle 11"/>
-          <p:cNvSpPr>
-            <a:spLocks noChangeArrowheads="1"/>
-          </p:cNvSpPr>
-          <p:nvPr/>
-        </p:nvSpPr>
-        <p:spPr bwMode="auto">
-          <a:xfrm>
-            <a:off x="2906713" y="5943600"/>
-            <a:ext cx="3265487" cy="609600"/>
-          </a:xfrm>
-          <a:prstGeom prst="rect">
-            <a:avLst/>
-          </a:prstGeom>
-          <a:noFill/>
-          <a:ln w="9525">
-            <a:noFill/>
-            <a:miter lim="800000"/>
-            <a:headEnd/>
-            <a:tailEnd/>
-          </a:ln>
-        </p:spPr>
-        <p:txBody>
-          <a:bodyPr/>
-          <a:lstStyle/>
-          <a:p>
-            <a:pPr algn="ctr" eaLnBrk="1" hangingPunct="1">
-              <a:spcBef>
-                <a:spcPct val="20000"/>
-              </a:spcBef>
-            </a:pPr>
-            <a:r>
-              <a:rPr lang="en-US" sz="2400" b="1" dirty="0">
-                <a:solidFill>
-                  <a:srgbClr val="FF0000"/>
-                </a:solidFill>
-              </a:rPr>
-              <a:t>Meditation</a:t>
-            </a:r>
-            <a:r>
-              <a:rPr lang="en-US" sz="2800" b="1" dirty="0">
-                <a:solidFill>
-                  <a:srgbClr val="FF0000"/>
-                </a:solidFill>
-              </a:rPr>
-              <a:t>……</a:t>
-            </a:r>
-          </a:p>
-        </p:txBody>
-      </p:sp>
-    </p:spTree>
-    <p:extLst>
-      <p:ext uri="{BB962C8B-B14F-4D97-AF65-F5344CB8AC3E}">
-        <p14:creationId xmlns:p14="http://schemas.microsoft.com/office/powerpoint/2010/main" val="3868086256"/>
-      </p:ext>
-    </p:extLst>
-  </p:cSld>
-  <p:clrMapOvr>
-    <a:masterClrMapping/>
-  </p:clrMapOvr>
-  <p:timing>
-    <p:tnLst>
-      <p:par>
-        <p:cTn xmlns:p14="http://schemas.microsoft.com/office/powerpoint/2010/main" id="1" dur="indefinite" restart="never" nodeType="tmRoot"/>
-      </p:par>
-    </p:tnLst>
-  </p:timing>
-</p:sld>
-</file>
-
-<file path=ppt/slides/slide17.xml><?xml version="1.0" encoding="utf-8"?>
-<p:sld xmlns:a="http://schemas.openxmlformats.org/drawingml/2006/main" xmlns:r="http://schemas.openxmlformats.org/officeDocument/2006/relationships" xmlns:p="http://schemas.openxmlformats.org/presentationml/2006/main">
-  <p:cSld>
-    <p:spTree>
-      <p:nvGrpSpPr>
-        <p:cNvPr id="1" name=""/>
-        <p:cNvGrpSpPr/>
-        <p:nvPr/>
-      </p:nvGrpSpPr>
-      <p:grpSpPr>
-        <a:xfrm>
-          <a:off x="0" y="0"/>
-          <a:ext cx="0" cy="0"/>
-          <a:chOff x="0" y="0"/>
-          <a:chExt cx="0" cy="0"/>
-        </a:xfrm>
-      </p:grpSpPr>
-      <p:sp>
-        <p:nvSpPr>
-          <p:cNvPr id="34818" name="Title 1"/>
-          <p:cNvSpPr>
-            <a:spLocks noGrp="1"/>
-          </p:cNvSpPr>
-          <p:nvPr>
-            <p:ph type="ctrTitle" idx="4294967295"/>
-          </p:nvPr>
-        </p:nvSpPr>
-        <p:spPr>
-          <a:xfrm>
-            <a:off x="2628900" y="304800"/>
-            <a:ext cx="3886200" cy="609600"/>
-          </a:xfrm>
-          <a:ln w="28575">
-            <a:noFill/>
-          </a:ln>
-        </p:spPr>
-        <p:txBody>
-          <a:bodyPr/>
-          <a:lstStyle/>
-          <a:p>
-            <a:pPr eaLnBrk="1" hangingPunct="1">
-              <a:defRPr/>
-            </a:pPr>
-            <a:r>
-              <a:rPr lang="en-US" sz="3200" b="1" dirty="0" smtClean="0">
-                <a:latin typeface="+mn-lt"/>
-                <a:ea typeface="ＭＳ Ｐゴシック" charset="0"/>
-                <a:cs typeface="ＭＳ Ｐゴシック" charset="0"/>
-              </a:rPr>
-              <a:t>Meditation</a:t>
-            </a:r>
-          </a:p>
-        </p:txBody>
-      </p:sp>
-      <p:sp>
-        <p:nvSpPr>
-          <p:cNvPr id="65539" name="Rectangle 11"/>
-          <p:cNvSpPr>
-            <a:spLocks noChangeArrowheads="1"/>
-          </p:cNvSpPr>
-          <p:nvPr/>
-        </p:nvSpPr>
-        <p:spPr bwMode="auto">
-          <a:xfrm>
-            <a:off x="3124200" y="6337300"/>
-            <a:ext cx="3252788" cy="368300"/>
-          </a:xfrm>
-          <a:prstGeom prst="rect">
-            <a:avLst/>
-          </a:prstGeom>
-          <a:noFill/>
-          <a:ln>
-            <a:noFill/>
-          </a:ln>
-          <a:extLst>
-            <a:ext uri="{909E8E84-426E-40dd-AFC4-6F175D3DCCD1}">
-              <a14:hiddenFill xmlns:a14="http://schemas.microsoft.com/office/drawing/2010/main">
-                <a:solidFill>
-                  <a:srgbClr val="FFFFFF"/>
-                </a:solidFill>
-              </a14:hiddenFill>
-            </a:ext>
-            <a:ext uri="{91240B29-F687-4f45-9708-019B960494DF}">
-              <a14:hiddenLine xmlns:a14="http://schemas.microsoft.com/office/drawing/2010/main" w="9525">
-                <a:solidFill>
-                  <a:srgbClr val="000000"/>
-                </a:solidFill>
-                <a:miter lim="800000"/>
-                <a:headEnd/>
-                <a:tailEnd/>
-              </a14:hiddenLine>
-            </a:ext>
-          </a:extLst>
-        </p:spPr>
-        <p:txBody>
-          <a:bodyPr/>
-          <a:lstStyle/>
-          <a:p>
-            <a:pPr algn="ctr" eaLnBrk="1" hangingPunct="1">
-              <a:spcBef>
-                <a:spcPct val="20000"/>
-              </a:spcBef>
-            </a:pPr>
-            <a:r>
-              <a:rPr lang="en-US" sz="2800" b="1" dirty="0">
-                <a:solidFill>
-                  <a:srgbClr val="FF0000"/>
-                </a:solidFill>
-              </a:rPr>
-              <a:t>Silent Departure……</a:t>
-            </a:r>
-          </a:p>
-          <a:p>
-            <a:pPr algn="ctr" eaLnBrk="1" hangingPunct="1">
-              <a:spcBef>
-                <a:spcPct val="20000"/>
-              </a:spcBef>
-            </a:pPr>
-            <a:endParaRPr lang="en-US" sz="2400" b="1" dirty="0">
-              <a:solidFill>
-                <a:srgbClr val="FF0000"/>
-              </a:solidFill>
-            </a:endParaRPr>
-          </a:p>
-        </p:txBody>
-      </p:sp>
-      <p:pic>
-        <p:nvPicPr>
-          <p:cNvPr id="1026" name="Picture 2" descr="http://images.fineartamerica.com/images-medium/one-red-candle-gary-smith.jpg">
-            <a:hlinkClick r:id="rId3" action="ppaction://hlinkfile"/>
-          </p:cNvPr>
-          <p:cNvPicPr>
-            <a:picLocks noChangeAspect="1" noChangeArrowheads="1"/>
-          </p:cNvPicPr>
-          <p:nvPr/>
-        </p:nvPicPr>
-        <p:blipFill>
-          <a:blip r:embed="rId4">
-            <a:extLst>
-              <a:ext uri="{28A0092B-C50C-407E-A947-70E740481C1C}">
-                <a14:useLocalDpi xmlns:a14="http://schemas.microsoft.com/office/drawing/2010/main" val="0"/>
-              </a:ext>
-            </a:extLst>
-          </a:blip>
-          <a:srcRect/>
-          <a:stretch>
-            <a:fillRect/>
-          </a:stretch>
-        </p:blipFill>
-        <p:spPr bwMode="auto">
-          <a:xfrm>
-            <a:off x="0" y="0"/>
-            <a:ext cx="9201150" cy="6858000"/>
-          </a:xfrm>
-          <a:prstGeom prst="rect">
-            <a:avLst/>
-          </a:prstGeom>
-          <a:noFill/>
-          <a:extLst>
-            <a:ext uri="{909E8E84-426E-40dd-AFC4-6F175D3DCCD1}">
-              <a14:hiddenFill xmlns:a14="http://schemas.microsoft.com/office/drawing/2010/main">
-                <a:solidFill>
-                  <a:srgbClr val="FFFFFF"/>
-                </a:solidFill>
-              </a14:hiddenFill>
-            </a:ext>
-          </a:extLst>
-        </p:spPr>
-      </p:pic>
-      <p:grpSp>
-        <p:nvGrpSpPr>
-          <p:cNvPr id="4" name="Group 3"/>
-          <p:cNvGrpSpPr/>
-          <p:nvPr/>
-        </p:nvGrpSpPr>
-        <p:grpSpPr>
-          <a:xfrm>
-            <a:off x="4150056" y="4724400"/>
-            <a:ext cx="914400" cy="914400"/>
-            <a:chOff x="4150056" y="5791200"/>
-            <a:chExt cx="914400" cy="914400"/>
-          </a:xfrm>
-        </p:grpSpPr>
-        <p:sp>
-          <p:nvSpPr>
-            <p:cNvPr id="2" name="Oval 1">
-              <a:hlinkClick r:id="rId5" action="ppaction://hlinkfile"/>
-            </p:cNvPr>
-            <p:cNvSpPr/>
-            <p:nvPr/>
-          </p:nvSpPr>
-          <p:spPr>
-            <a:xfrm>
-              <a:off x="4150056" y="5791200"/>
-              <a:ext cx="914400" cy="914400"/>
-            </a:xfrm>
-            <a:prstGeom prst="ellipse">
-              <a:avLst/>
-            </a:prstGeom>
-            <a:solidFill>
-              <a:srgbClr val="DE7146"/>
-            </a:solidFill>
-            <a:ln>
-              <a:noFill/>
-            </a:ln>
-          </p:spPr>
-          <p:style>
-            <a:lnRef idx="2">
-              <a:schemeClr val="accent1">
-                <a:shade val="50000"/>
-              </a:schemeClr>
-            </a:lnRef>
-            <a:fillRef idx="1">
-              <a:schemeClr val="accent1"/>
-            </a:fillRef>
-            <a:effectRef idx="0">
-              <a:schemeClr val="accent1"/>
-            </a:effectRef>
-            <a:fontRef idx="minor">
-              <a:schemeClr val="lt1"/>
-            </a:fontRef>
-          </p:style>
-          <p:txBody>
-            <a:bodyPr rtlCol="0" anchor="ctr"/>
-            <a:lstStyle/>
-            <a:p>
-              <a:pPr algn="ctr"/>
-              <a:endParaRPr lang="en-US" sz="2000" b="1" dirty="0">
-                <a:cs typeface="Aparajita" panose="020B0604020202020204" pitchFamily="34" charset="0"/>
-              </a:endParaRPr>
-            </a:p>
-          </p:txBody>
-        </p:sp>
-        <p:sp>
-          <p:nvSpPr>
-            <p:cNvPr id="3" name="Rectangle 2"/>
-            <p:cNvSpPr/>
-            <p:nvPr/>
-          </p:nvSpPr>
-          <p:spPr>
-            <a:xfrm>
-              <a:off x="4341957" y="6039428"/>
-              <a:ext cx="676788" cy="523220"/>
-            </a:xfrm>
-            <a:prstGeom prst="rect">
-              <a:avLst/>
-            </a:prstGeom>
-          </p:spPr>
-          <p:txBody>
-            <a:bodyPr wrap="none">
-              <a:spAutoFit/>
-            </a:bodyPr>
-            <a:lstStyle/>
-            <a:p>
-              <a:pPr algn="ctr"/>
-              <a:r>
-                <a:rPr lang="gu-IN" sz="2800" b="1" dirty="0" smtClean="0">
-                  <a:solidFill>
-                    <a:srgbClr val="FF0000"/>
-                  </a:solidFill>
-                  <a:latin typeface="+mn-lt"/>
-                </a:rPr>
-                <a:t>ૐ</a:t>
-              </a:r>
-              <a:r>
-                <a:rPr lang="gu-IN" sz="2800" b="1" dirty="0">
-                  <a:solidFill>
-                    <a:srgbClr val="FF0000"/>
-                  </a:solidFill>
-                  <a:latin typeface="+mn-lt"/>
-                </a:rPr>
-                <a:t> </a:t>
-              </a:r>
-              <a:endParaRPr lang="en-US" sz="2800" b="1" dirty="0">
-                <a:solidFill>
-                  <a:srgbClr val="FF0000"/>
-                </a:solidFill>
-                <a:latin typeface="+mn-lt"/>
-              </a:endParaRPr>
-            </a:p>
-          </p:txBody>
-        </p:sp>
-      </p:grpSp>
-      <p:sp>
-        <p:nvSpPr>
-          <p:cNvPr id="8" name="TextBox 7"/>
-          <p:cNvSpPr txBox="1"/>
-          <p:nvPr/>
-        </p:nvSpPr>
-        <p:spPr>
-          <a:xfrm>
-            <a:off x="2286000" y="6019800"/>
-            <a:ext cx="4766048" cy="769441"/>
-          </a:xfrm>
-          <a:prstGeom prst="rect">
-            <a:avLst/>
-          </a:prstGeom>
-          <a:noFill/>
-        </p:spPr>
-        <p:txBody>
-          <a:bodyPr wrap="none" rtlCol="0">
-            <a:spAutoFit/>
-          </a:bodyPr>
-          <a:lstStyle/>
-          <a:p>
-            <a:pPr algn="ctr"/>
-            <a:r>
-              <a:rPr lang="en-US" sz="4400" b="1" dirty="0" smtClean="0">
-                <a:solidFill>
-                  <a:schemeClr val="bg1"/>
-                </a:solidFill>
-                <a:latin typeface="Comic Sans MS" panose="030F0702030302020204" pitchFamily="66" charset="0"/>
-              </a:rPr>
-              <a:t>Silent Departure</a:t>
-            </a:r>
-            <a:endParaRPr lang="en-US" sz="4400" b="1" dirty="0">
-              <a:solidFill>
-                <a:schemeClr val="bg1"/>
-              </a:solidFill>
-              <a:latin typeface="Comic Sans MS" panose="030F0702030302020204" pitchFamily="66" charset="0"/>
-            </a:endParaRPr>
-          </a:p>
-        </p:txBody>
-      </p:sp>
-    </p:spTree>
-    <p:extLst>
-      <p:ext uri="{BB962C8B-B14F-4D97-AF65-F5344CB8AC3E}">
-        <p14:creationId xmlns:p14="http://schemas.microsoft.com/office/powerpoint/2010/main" val="1319482367"/>
-      </p:ext>
-    </p:extLst>
-  </p:cSld>
-  <p:clrMapOvr>
-    <a:masterClrMapping/>
-  </p:clrMapOvr>
-  <p:timing>
-    <p:tnLst>
-      <p:par>
-        <p:cTn xmlns:p14="http://schemas.microsoft.com/office/powerpoint/2010/main" id="1" dur="indefinite" restart="never" nodeType="tmRoot">
-          <p:childTnLst>
-            <p:seq concurrent="1" nextAc="seek">
-              <p:cTn id="2" dur="indefinite" nodeType="mainSeq">
-                <p:childTnLst>
-                  <p:par>
-                    <p:cTn id="3" fill="hold">
-                      <p:stCondLst>
-                        <p:cond delay="indefinite"/>
-                      </p:stCondLst>
-                      <p:childTnLst>
-                        <p:par>
-                          <p:cTn id="4" fill="hold">
-                            <p:stCondLst>
-                              <p:cond delay="0"/>
-                            </p:stCondLst>
-                            <p:childTnLst>
-                              <p:par>
-                                <p:cTn id="5" presetID="26" presetClass="entr" presetSubtype="0" fill="hold" grpId="0" nodeType="clickEffect">
-                                  <p:stCondLst>
-                                    <p:cond delay="60000"/>
-                                  </p:stCondLst>
-                                  <p:childTnLst>
-                                    <p:set>
-                                      <p:cBhvr>
-                                        <p:cTn id="6" dur="1" fill="hold">
-                                          <p:stCondLst>
-                                            <p:cond delay="0"/>
-                                          </p:stCondLst>
-                                        </p:cTn>
-                                        <p:tgtEl>
-                                          <p:spTgt spid="8"/>
-                                        </p:tgtEl>
-                                        <p:attrNameLst>
-                                          <p:attrName>style.visibility</p:attrName>
-                                        </p:attrNameLst>
-                                      </p:cBhvr>
-                                      <p:to>
-                                        <p:strVal val="visible"/>
-                                      </p:to>
-                                    </p:set>
-                                    <p:animEffect transition="in" filter="wipe(down)">
-                                      <p:cBhvr>
-                                        <p:cTn id="7" dur="1450">
-                                          <p:stCondLst>
-                                            <p:cond delay="0"/>
-                                          </p:stCondLst>
-                                        </p:cTn>
-                                        <p:tgtEl>
-                                          <p:spTgt spid="8"/>
-                                        </p:tgtEl>
-                                      </p:cBhvr>
-                                    </p:animEffect>
-                                    <p:anim calcmode="lin" valueType="num">
-                                      <p:cBhvr>
-                                        <p:cTn id="8" dur="4555" tmFilter="0,0; 0.14,0.36; 0.43,0.73; 0.71,0.91; 1.0,1.0">
-                                          <p:stCondLst>
-                                            <p:cond delay="0"/>
-                                          </p:stCondLst>
-                                        </p:cTn>
-                                        <p:tgtEl>
-                                          <p:spTgt spid="8"/>
-                                        </p:tgtEl>
-                                        <p:attrNameLst>
-                                          <p:attrName>ppt_x</p:attrName>
-                                        </p:attrNameLst>
-                                      </p:cBhvr>
-                                      <p:tavLst>
-                                        <p:tav tm="0">
-                                          <p:val>
-                                            <p:strVal val="#ppt_x-0.25"/>
-                                          </p:val>
-                                        </p:tav>
-                                        <p:tav tm="100000">
-                                          <p:val>
-                                            <p:strVal val="#ppt_x"/>
-                                          </p:val>
-                                        </p:tav>
-                                      </p:tavLst>
-                                    </p:anim>
-                                    <p:anim calcmode="lin" valueType="num">
-                                      <p:cBhvr>
-                                        <p:cTn id="9" dur="1660" tmFilter="0.0,0.0; 0.25,0.07; 0.50,0.2; 0.75,0.467; 1.0,1.0">
-                                          <p:stCondLst>
-                                            <p:cond delay="0"/>
-                                          </p:stCondLst>
-                                        </p:cTn>
-                                        <p:tgtEl>
-                                          <p:spTgt spid="8"/>
-                                        </p:tgtEl>
-                                        <p:attrNameLst>
-                                          <p:attrName>ppt_y</p:attrName>
-                                        </p:attrNameLst>
-                                      </p:cBhvr>
-                                      <p:tavLst>
-                                        <p:tav tm="0" fmla="#ppt_y-sin(pi*$)/3">
-                                          <p:val>
-                                            <p:fltVal val="0.5"/>
-                                          </p:val>
-                                        </p:tav>
-                                        <p:tav tm="100000">
-                                          <p:val>
-                                            <p:fltVal val="1"/>
-                                          </p:val>
-                                        </p:tav>
-                                      </p:tavLst>
-                                    </p:anim>
-                                    <p:anim calcmode="lin" valueType="num">
-                                      <p:cBhvr>
-                                        <p:cTn id="10" dur="1660" tmFilter="0, 0; 0.125,0.2665; 0.25,0.4; 0.375,0.465; 0.5,0.5;  0.625,0.535; 0.75,0.6; 0.875,0.7335; 1,1">
-                                          <p:stCondLst>
-                                            <p:cond delay="1660"/>
-                                          </p:stCondLst>
-                                        </p:cTn>
-                                        <p:tgtEl>
-                                          <p:spTgt spid="8"/>
-                                        </p:tgtEl>
-                                        <p:attrNameLst>
-                                          <p:attrName>ppt_y</p:attrName>
-                                        </p:attrNameLst>
-                                      </p:cBhvr>
-                                      <p:tavLst>
-                                        <p:tav tm="0" fmla="#ppt_y-sin(pi*$)/9">
-                                          <p:val>
-                                            <p:fltVal val="0"/>
-                                          </p:val>
-                                        </p:tav>
-                                        <p:tav tm="100000">
-                                          <p:val>
-                                            <p:fltVal val="1"/>
-                                          </p:val>
-                                        </p:tav>
-                                      </p:tavLst>
-                                    </p:anim>
-                                    <p:anim calcmode="lin" valueType="num">
-                                      <p:cBhvr>
-                                        <p:cTn id="11" dur="830" tmFilter="0, 0; 0.125,0.2665; 0.25,0.4; 0.375,0.465; 0.5,0.5;  0.625,0.535; 0.75,0.6; 0.875,0.7335; 1,1">
-                                          <p:stCondLst>
-                                            <p:cond delay="3310"/>
-                                          </p:stCondLst>
-                                        </p:cTn>
-                                        <p:tgtEl>
-                                          <p:spTgt spid="8"/>
-                                        </p:tgtEl>
-                                        <p:attrNameLst>
-                                          <p:attrName>ppt_y</p:attrName>
-                                        </p:attrNameLst>
-                                      </p:cBhvr>
-                                      <p:tavLst>
-                                        <p:tav tm="0" fmla="#ppt_y-sin(pi*$)/27">
-                                          <p:val>
-                                            <p:fltVal val="0"/>
-                                          </p:val>
-                                        </p:tav>
-                                        <p:tav tm="100000">
-                                          <p:val>
-                                            <p:fltVal val="1"/>
-                                          </p:val>
-                                        </p:tav>
-                                      </p:tavLst>
-                                    </p:anim>
-                                    <p:anim calcmode="lin" valueType="num">
-                                      <p:cBhvr>
-                                        <p:cTn id="12" dur="410" tmFilter="0, 0; 0.125,0.2665; 0.25,0.4; 0.375,0.465; 0.5,0.5;  0.625,0.535; 0.75,0.6; 0.875,0.7335; 1,1">
-                                          <p:stCondLst>
-                                            <p:cond delay="4140"/>
-                                          </p:stCondLst>
-                                        </p:cTn>
-                                        <p:tgtEl>
-                                          <p:spTgt spid="8"/>
-                                        </p:tgtEl>
-                                        <p:attrNameLst>
-                                          <p:attrName>ppt_y</p:attrName>
-                                        </p:attrNameLst>
-                                      </p:cBhvr>
-                                      <p:tavLst>
-                                        <p:tav tm="0" fmla="#ppt_y-sin(pi*$)/81">
-                                          <p:val>
-                                            <p:fltVal val="0"/>
-                                          </p:val>
-                                        </p:tav>
-                                        <p:tav tm="100000">
-                                          <p:val>
-                                            <p:fltVal val="1"/>
-                                          </p:val>
-                                        </p:tav>
-                                      </p:tavLst>
-                                    </p:anim>
-                                    <p:animScale>
-                                      <p:cBhvr>
-                                        <p:cTn id="13" dur="65">
-                                          <p:stCondLst>
-                                            <p:cond delay="1625"/>
-                                          </p:stCondLst>
-                                        </p:cTn>
-                                        <p:tgtEl>
-                                          <p:spTgt spid="8"/>
-                                        </p:tgtEl>
-                                      </p:cBhvr>
-                                      <p:to x="100000" y="60000"/>
-                                    </p:animScale>
-                                    <p:animScale>
-                                      <p:cBhvr>
-                                        <p:cTn id="14" dur="415" decel="50000">
-                                          <p:stCondLst>
-                                            <p:cond delay="1690"/>
-                                          </p:stCondLst>
-                                        </p:cTn>
-                                        <p:tgtEl>
-                                          <p:spTgt spid="8"/>
-                                        </p:tgtEl>
-                                      </p:cBhvr>
-                                      <p:to x="100000" y="100000"/>
-                                    </p:animScale>
-                                    <p:animScale>
-                                      <p:cBhvr>
-                                        <p:cTn id="15" dur="65">
-                                          <p:stCondLst>
-                                            <p:cond delay="3280"/>
-                                          </p:stCondLst>
-                                        </p:cTn>
-                                        <p:tgtEl>
-                                          <p:spTgt spid="8"/>
-                                        </p:tgtEl>
-                                      </p:cBhvr>
-                                      <p:to x="100000" y="80000"/>
-                                    </p:animScale>
-                                    <p:animScale>
-                                      <p:cBhvr>
-                                        <p:cTn id="16" dur="415" decel="50000">
-                                          <p:stCondLst>
-                                            <p:cond delay="3345"/>
-                                          </p:stCondLst>
-                                        </p:cTn>
-                                        <p:tgtEl>
-                                          <p:spTgt spid="8"/>
-                                        </p:tgtEl>
-                                      </p:cBhvr>
-                                      <p:to x="100000" y="100000"/>
-                                    </p:animScale>
-                                    <p:animScale>
-                                      <p:cBhvr>
-                                        <p:cTn id="17" dur="65">
-                                          <p:stCondLst>
-                                            <p:cond delay="4105"/>
-                                          </p:stCondLst>
-                                        </p:cTn>
-                                        <p:tgtEl>
-                                          <p:spTgt spid="8"/>
-                                        </p:tgtEl>
-                                      </p:cBhvr>
-                                      <p:to x="100000" y="90000"/>
-                                    </p:animScale>
-                                    <p:animScale>
-                                      <p:cBhvr>
-                                        <p:cTn id="18" dur="415" decel="50000">
-                                          <p:stCondLst>
-                                            <p:cond delay="4170"/>
-                                          </p:stCondLst>
-                                        </p:cTn>
-                                        <p:tgtEl>
-                                          <p:spTgt spid="8"/>
-                                        </p:tgtEl>
-                                      </p:cBhvr>
-                                      <p:to x="100000" y="100000"/>
-                                    </p:animScale>
-                                    <p:animScale>
-                                      <p:cBhvr>
-                                        <p:cTn id="19" dur="65">
-                                          <p:stCondLst>
-                                            <p:cond delay="4520"/>
-                                          </p:stCondLst>
-                                        </p:cTn>
-                                        <p:tgtEl>
-                                          <p:spTgt spid="8"/>
-                                        </p:tgtEl>
-                                      </p:cBhvr>
-                                      <p:to x="100000" y="95000"/>
-                                    </p:animScale>
-                                    <p:animScale>
-                                      <p:cBhvr>
-                                        <p:cTn id="20" dur="415" decel="50000">
-                                          <p:stCondLst>
-                                            <p:cond delay="4585"/>
-                                          </p:stCondLst>
-                                        </p:cTn>
-                                        <p:tgtEl>
-                                          <p:spTgt spid="8"/>
-                                        </p:tgtEl>
-                                      </p:cBhvr>
-                                      <p:to x="100000" y="100000"/>
-                                    </p:animScale>
-                                  </p:childTnLst>
-                                </p:cTn>
-                              </p:par>
-                            </p:childTnLst>
-                          </p:cTn>
-                        </p:par>
-                      </p:childTnLst>
-                    </p:cTn>
-                  </p:par>
-                </p:childTnLst>
-              </p:cTn>
-              <p:prevCondLst>
-                <p:cond evt="onPrev" delay="0">
-                  <p:tgtEl>
-                    <p:sldTgt/>
-                  </p:tgtEl>
-                </p:cond>
-              </p:prevCondLst>
-              <p:nextCondLst>
-                <p:cond evt="onNext" delay="0">
-                  <p:tgtEl>
-                    <p:sldTgt/>
-                  </p:tgtEl>
-                </p:cond>
-              </p:nextCondLst>
-            </p:seq>
-          </p:childTnLst>
-        </p:cTn>
-      </p:par>
-    </p:tnLst>
-    <p:bldLst>
-      <p:bldP spid="8" grpId="0"/>
-    </p:bldLst>
-  </p:timing>
-</p:sld>
-</file>
-
-<file path=ppt/slides/slide18.xml><?xml version="1.0" encoding="utf-8"?>
-<p:sld xmlns:a="http://schemas.openxmlformats.org/drawingml/2006/main" xmlns:r="http://schemas.openxmlformats.org/officeDocument/2006/relationships" xmlns:p="http://schemas.openxmlformats.org/presentationml/2006/main">
-  <p:cSld>
-    <p:spTree>
-      <p:nvGrpSpPr>
-        <p:cNvPr id="1" name=""/>
-        <p:cNvGrpSpPr/>
-        <p:nvPr/>
-      </p:nvGrpSpPr>
-      <p:grpSpPr>
-        <a:xfrm>
-          <a:off x="0" y="0"/>
-          <a:ext cx="0" cy="0"/>
-          <a:chOff x="0" y="0"/>
-          <a:chExt cx="0" cy="0"/>
-        </a:xfrm>
-      </p:grpSpPr>
-      <p:pic>
-        <p:nvPicPr>
-          <p:cNvPr id="4098" name="Picture 4" descr="Swami's Feet on Cushion"/>
-          <p:cNvPicPr>
-            <a:picLocks noChangeAspect="1" noChangeArrowheads="1"/>
-          </p:cNvPicPr>
-          <p:nvPr/>
-        </p:nvPicPr>
-        <p:blipFill>
-          <a:blip r:embed="rId2" cstate="print">
-            <a:extLst>
-              <a:ext uri="{28A0092B-C50C-407E-A947-70E740481C1C}">
-                <a14:useLocalDpi xmlns:a14="http://schemas.microsoft.com/office/drawing/2010/main" val="0"/>
-              </a:ext>
-            </a:extLst>
-          </a:blip>
-          <a:srcRect/>
-          <a:stretch>
-            <a:fillRect/>
-          </a:stretch>
-        </p:blipFill>
-        <p:spPr bwMode="auto">
-          <a:xfrm>
-            <a:off x="0" y="-3175"/>
-            <a:ext cx="9144000" cy="6869113"/>
-          </a:xfrm>
-          <a:prstGeom prst="rect">
-            <a:avLst/>
-          </a:prstGeom>
-          <a:noFill/>
-          <a:ln>
-            <a:noFill/>
-          </a:ln>
-          <a:extLst>
-            <a:ext uri="{909E8E84-426E-40dd-AFC4-6F175D3DCCD1}">
-              <a14:hiddenFill xmlns:a14="http://schemas.microsoft.com/office/drawing/2010/main">
-                <a:solidFill>
-                  <a:srgbClr val="FFFFFF"/>
-                </a:solidFill>
-              </a14:hiddenFill>
-            </a:ext>
-            <a:ext uri="{91240B29-F687-4f45-9708-019B960494DF}">
-              <a14:hiddenLine xmlns:a14="http://schemas.microsoft.com/office/drawing/2010/main" w="9525">
-                <a:solidFill>
-                  <a:srgbClr val="000000"/>
-                </a:solidFill>
-                <a:miter lim="800000"/>
-                <a:headEnd/>
-                <a:tailEnd/>
-              </a14:hiddenLine>
-            </a:ext>
-          </a:extLst>
-        </p:spPr>
-      </p:pic>
-      <p:sp>
-        <p:nvSpPr>
-          <p:cNvPr id="4099" name="Text Box 6"/>
-          <p:cNvSpPr txBox="1">
-            <a:spLocks noChangeArrowheads="1"/>
-          </p:cNvSpPr>
-          <p:nvPr/>
-        </p:nvSpPr>
-        <p:spPr bwMode="auto">
-          <a:xfrm>
-            <a:off x="152400" y="5791200"/>
-            <a:ext cx="8839200" cy="762000"/>
-          </a:xfrm>
-          <a:prstGeom prst="rect">
-            <a:avLst/>
-          </a:prstGeom>
-          <a:noFill/>
-          <a:ln>
-            <a:noFill/>
-          </a:ln>
-          <a:extLst>
-            <a:ext uri="{909E8E84-426E-40dd-AFC4-6F175D3DCCD1}">
-              <a14:hiddenFill xmlns:a14="http://schemas.microsoft.com/office/drawing/2010/main">
-                <a:solidFill>
-                  <a:srgbClr val="FFFFFF"/>
-                </a:solidFill>
-              </a14:hiddenFill>
-            </a:ext>
-            <a:ext uri="{91240B29-F687-4f45-9708-019B960494DF}">
-              <a14:hiddenLine xmlns:a14="http://schemas.microsoft.com/office/drawing/2010/main" w="9525">
-                <a:solidFill>
-                  <a:srgbClr val="000000"/>
-                </a:solidFill>
-                <a:miter lim="800000"/>
-                <a:headEnd/>
-                <a:tailEnd/>
-              </a14:hiddenLine>
-            </a:ext>
-          </a:extLst>
-        </p:spPr>
-        <p:txBody>
-          <a:bodyPr>
-            <a:spAutoFit/>
-          </a:bodyPr>
-          <a:lstStyle>
-            <a:lvl1pPr eaLnBrk="0" hangingPunct="0">
-              <a:defRPr sz="4400">
-                <a:solidFill>
-                  <a:schemeClr val="tx2"/>
-                </a:solidFill>
-                <a:latin typeface="Times New Roman" pitchFamily="18" charset="0"/>
-              </a:defRPr>
-            </a:lvl1pPr>
-            <a:lvl2pPr marL="742950" indent="-285750" eaLnBrk="0" hangingPunct="0">
-              <a:defRPr sz="4400">
-                <a:solidFill>
-                  <a:schemeClr val="tx2"/>
-                </a:solidFill>
-                <a:latin typeface="Times New Roman" pitchFamily="18" charset="0"/>
-              </a:defRPr>
-            </a:lvl2pPr>
-            <a:lvl3pPr marL="1143000" indent="-228600" eaLnBrk="0" hangingPunct="0">
-              <a:defRPr sz="4400">
-                <a:solidFill>
-                  <a:schemeClr val="tx2"/>
-                </a:solidFill>
-                <a:latin typeface="Times New Roman" pitchFamily="18" charset="0"/>
-              </a:defRPr>
-            </a:lvl3pPr>
-            <a:lvl4pPr marL="1600200" indent="-228600" eaLnBrk="0" hangingPunct="0">
-              <a:defRPr sz="4400">
-                <a:solidFill>
-                  <a:schemeClr val="tx2"/>
-                </a:solidFill>
-                <a:latin typeface="Times New Roman" pitchFamily="18" charset="0"/>
-              </a:defRPr>
-            </a:lvl4pPr>
-            <a:lvl5pPr marL="2057400" indent="-228600" eaLnBrk="0" hangingPunct="0">
-              <a:defRPr sz="4400">
-                <a:solidFill>
-                  <a:schemeClr val="tx2"/>
-                </a:solidFill>
-                <a:latin typeface="Times New Roman" pitchFamily="18" charset="0"/>
-              </a:defRPr>
-            </a:lvl5pPr>
-            <a:lvl6pPr marL="2514600" indent="-228600" algn="ctr" eaLnBrk="0" fontAlgn="base" hangingPunct="0">
-              <a:spcBef>
-                <a:spcPct val="0"/>
-              </a:spcBef>
-              <a:spcAft>
-                <a:spcPct val="0"/>
-              </a:spcAft>
-              <a:defRPr sz="4400">
-                <a:solidFill>
-                  <a:schemeClr val="tx2"/>
-                </a:solidFill>
-                <a:latin typeface="Times New Roman" pitchFamily="18" charset="0"/>
-              </a:defRPr>
-            </a:lvl6pPr>
-            <a:lvl7pPr marL="2971800" indent="-228600" algn="ctr" eaLnBrk="0" fontAlgn="base" hangingPunct="0">
-              <a:spcBef>
-                <a:spcPct val="0"/>
-              </a:spcBef>
-              <a:spcAft>
-                <a:spcPct val="0"/>
-              </a:spcAft>
-              <a:defRPr sz="4400">
-                <a:solidFill>
-                  <a:schemeClr val="tx2"/>
-                </a:solidFill>
-                <a:latin typeface="Times New Roman" pitchFamily="18" charset="0"/>
-              </a:defRPr>
-            </a:lvl7pPr>
-            <a:lvl8pPr marL="3429000" indent="-228600" algn="ctr" eaLnBrk="0" fontAlgn="base" hangingPunct="0">
-              <a:spcBef>
-                <a:spcPct val="0"/>
-              </a:spcBef>
-              <a:spcAft>
-                <a:spcPct val="0"/>
-              </a:spcAft>
-              <a:defRPr sz="4400">
-                <a:solidFill>
-                  <a:schemeClr val="tx2"/>
-                </a:solidFill>
-                <a:latin typeface="Times New Roman" pitchFamily="18" charset="0"/>
-              </a:defRPr>
-            </a:lvl8pPr>
-            <a:lvl9pPr marL="3886200" indent="-228600" algn="ctr" eaLnBrk="0" fontAlgn="base" hangingPunct="0">
-              <a:spcBef>
-                <a:spcPct val="0"/>
-              </a:spcBef>
-              <a:spcAft>
-                <a:spcPct val="0"/>
-              </a:spcAft>
-              <a:defRPr sz="4400">
-                <a:solidFill>
-                  <a:schemeClr val="tx2"/>
-                </a:solidFill>
-                <a:latin typeface="Times New Roman" pitchFamily="18" charset="0"/>
-              </a:defRPr>
-            </a:lvl9pPr>
-          </a:lstStyle>
-          <a:p>
-            <a:pPr algn="ctr">
-              <a:spcBef>
-                <a:spcPct val="50000"/>
-              </a:spcBef>
-            </a:pPr>
-            <a:r>
-              <a:rPr lang="en-US" altLang="en-US" b="1" dirty="0" smtClean="0">
-                <a:solidFill>
-                  <a:schemeClr val="bg1"/>
-                </a:solidFill>
-                <a:latin typeface="Arial" charset="0"/>
-              </a:rPr>
-              <a:t>Love All &amp; Serve All</a:t>
-            </a:r>
-            <a:endParaRPr lang="en-US" altLang="en-US" b="1" dirty="0">
-              <a:solidFill>
-                <a:schemeClr val="bg1"/>
-              </a:solidFill>
-              <a:latin typeface="Arial" charset="0"/>
-            </a:endParaRPr>
-          </a:p>
-        </p:txBody>
-      </p:sp>
-    </p:spTree>
-    <p:extLst>
-      <p:ext uri="{BB962C8B-B14F-4D97-AF65-F5344CB8AC3E}">
-        <p14:creationId xmlns:p14="http://schemas.microsoft.com/office/powerpoint/2010/main" val="241723341"/>
       </p:ext>
     </p:extLst>
   </p:cSld>

</xml_diff>